<commit_message>
Removed Extra Line and Fixed PPT
Removed an extra markdown cell and fixed a spelling mistake in the ppt.
</commit_message>
<xml_diff>
--- a/AnalysisPresentation.pptx
+++ b/AnalysisPresentation.pptx
@@ -12,6 +12,8 @@
     <p:sldId id="260" r:id="rId6"/>
     <p:sldId id="261" r:id="rId7"/>
     <p:sldId id="262" r:id="rId8"/>
+    <p:sldId id="263" r:id="rId9"/>
+    <p:sldId id="264" r:id="rId10"/>
   </p:sldIdLst>
   <p:sldSz cx="12192000" cy="6858000"/>
   <p:notesSz cx="6858000" cy="9144000"/>
@@ -4156,8 +4158,8 @@
         </p:nvSpPr>
         <p:spPr>
           <a:xfrm>
-            <a:off x="601673" y="5646200"/>
-            <a:ext cx="3633923" cy="807304"/>
+            <a:off x="601673" y="5336495"/>
+            <a:ext cx="3633923" cy="1603947"/>
           </a:xfrm>
         </p:spPr>
         <p:txBody>
@@ -4172,7 +4174,17 @@
                   <a:srgbClr val="FFFFFF"/>
                 </a:solidFill>
               </a:rPr>
-              <a:t>Fernando Herrera Garza</a:t>
+              <a:t>Data Analytics Team</a:t>
+            </a:r>
+          </a:p>
+          <a:p>
+            <a:r>
+              <a:rPr lang="es-MX" sz="2000" dirty="0">
+                <a:solidFill>
+                  <a:srgbClr val="FFFFFF"/>
+                </a:solidFill>
+              </a:rPr>
+              <a:t>Arca Continental</a:t>
             </a:r>
           </a:p>
           <a:p>
@@ -4184,6 +4196,13 @@
               </a:rPr>
               <a:t>Nov 2nd, 2023 </a:t>
             </a:r>
+          </a:p>
+          <a:p>
+            <a:endParaRPr lang="es-MX" sz="2000" dirty="0">
+              <a:solidFill>
+                <a:srgbClr val="FFFFFF"/>
+              </a:solidFill>
+            </a:endParaRPr>
           </a:p>
         </p:txBody>
       </p:sp>
@@ -5011,6 +5030,221 @@
           </a:p>
         </p:txBody>
       </p:sp>
+      <p:sp>
+        <p:nvSpPr>
+          <p:cNvPr id="7" name="Subtítulo 2">
+            <a:extLst>
+              <a:ext uri="{FF2B5EF4-FFF2-40B4-BE49-F238E27FC236}">
+                <a16:creationId xmlns:a16="http://schemas.microsoft.com/office/drawing/2014/main" id="{58D95A80-0F14-4FA7-B11E-9B132A644C62}"/>
+              </a:ext>
+            </a:extLst>
+          </p:cNvPr>
+          <p:cNvSpPr txBox="1">
+            <a:spLocks/>
+          </p:cNvSpPr>
+          <p:nvPr/>
+        </p:nvSpPr>
+        <p:spPr>
+          <a:xfrm>
+            <a:off x="7788267" y="5720645"/>
+            <a:ext cx="3633923" cy="807304"/>
+          </a:xfrm>
+          <a:prstGeom prst="rect">
+            <a:avLst/>
+          </a:prstGeom>
+        </p:spPr>
+        <p:txBody>
+          <a:bodyPr vert="horz" lIns="91440" tIns="45720" rIns="91440" bIns="45720" rtlCol="0" anchor="ctr">
+            <a:normAutofit/>
+          </a:bodyPr>
+          <a:lstStyle>
+            <a:lvl1pPr marL="0" indent="0" algn="l" defTabSz="914400" rtl="0" eaLnBrk="1" latinLnBrk="0" hangingPunct="1">
+              <a:lnSpc>
+                <a:spcPct val="90000"/>
+              </a:lnSpc>
+              <a:spcBef>
+                <a:spcPts val="1000"/>
+              </a:spcBef>
+              <a:buFont typeface="Arial" panose="020B0604020202020204" pitchFamily="34" charset="0"/>
+              <a:buNone/>
+              <a:defRPr sz="2400" kern="1200">
+                <a:solidFill>
+                  <a:schemeClr val="tx1"/>
+                </a:solidFill>
+                <a:latin typeface="+mn-lt"/>
+                <a:ea typeface="+mn-ea"/>
+                <a:cs typeface="+mn-cs"/>
+              </a:defRPr>
+            </a:lvl1pPr>
+            <a:lvl2pPr marL="457200" indent="0" algn="ctr" defTabSz="914400" rtl="0" eaLnBrk="1" latinLnBrk="0" hangingPunct="1">
+              <a:lnSpc>
+                <a:spcPct val="90000"/>
+              </a:lnSpc>
+              <a:spcBef>
+                <a:spcPts val="500"/>
+              </a:spcBef>
+              <a:buFont typeface="Arial" panose="020B0604020202020204" pitchFamily="34" charset="0"/>
+              <a:buNone/>
+              <a:defRPr sz="2000" kern="1200">
+                <a:solidFill>
+                  <a:schemeClr val="tx1"/>
+                </a:solidFill>
+                <a:latin typeface="+mn-lt"/>
+                <a:ea typeface="+mn-ea"/>
+                <a:cs typeface="+mn-cs"/>
+              </a:defRPr>
+            </a:lvl2pPr>
+            <a:lvl3pPr marL="914400" indent="0" algn="ctr" defTabSz="914400" rtl="0" eaLnBrk="1" latinLnBrk="0" hangingPunct="1">
+              <a:lnSpc>
+                <a:spcPct val="90000"/>
+              </a:lnSpc>
+              <a:spcBef>
+                <a:spcPts val="500"/>
+              </a:spcBef>
+              <a:buFont typeface="Arial" panose="020B0604020202020204" pitchFamily="34" charset="0"/>
+              <a:buNone/>
+              <a:defRPr sz="1800" kern="1200">
+                <a:solidFill>
+                  <a:schemeClr val="tx1"/>
+                </a:solidFill>
+                <a:latin typeface="+mn-lt"/>
+                <a:ea typeface="+mn-ea"/>
+                <a:cs typeface="+mn-cs"/>
+              </a:defRPr>
+            </a:lvl3pPr>
+            <a:lvl4pPr marL="1371600" indent="0" algn="ctr" defTabSz="914400" rtl="0" eaLnBrk="1" latinLnBrk="0" hangingPunct="1">
+              <a:lnSpc>
+                <a:spcPct val="90000"/>
+              </a:lnSpc>
+              <a:spcBef>
+                <a:spcPts val="500"/>
+              </a:spcBef>
+              <a:buFont typeface="Arial" panose="020B0604020202020204" pitchFamily="34" charset="0"/>
+              <a:buNone/>
+              <a:defRPr sz="1600" kern="1200">
+                <a:solidFill>
+                  <a:schemeClr val="tx1"/>
+                </a:solidFill>
+                <a:latin typeface="+mn-lt"/>
+                <a:ea typeface="+mn-ea"/>
+                <a:cs typeface="+mn-cs"/>
+              </a:defRPr>
+            </a:lvl4pPr>
+            <a:lvl5pPr marL="1828800" indent="0" algn="ctr" defTabSz="914400" rtl="0" eaLnBrk="1" latinLnBrk="0" hangingPunct="1">
+              <a:lnSpc>
+                <a:spcPct val="90000"/>
+              </a:lnSpc>
+              <a:spcBef>
+                <a:spcPts val="500"/>
+              </a:spcBef>
+              <a:buFont typeface="Arial" panose="020B0604020202020204" pitchFamily="34" charset="0"/>
+              <a:buNone/>
+              <a:defRPr sz="1600" kern="1200">
+                <a:solidFill>
+                  <a:schemeClr val="tx1"/>
+                </a:solidFill>
+                <a:latin typeface="+mn-lt"/>
+                <a:ea typeface="+mn-ea"/>
+                <a:cs typeface="+mn-cs"/>
+              </a:defRPr>
+            </a:lvl5pPr>
+            <a:lvl6pPr marL="2286000" indent="0" algn="ctr" defTabSz="914400" rtl="0" eaLnBrk="1" latinLnBrk="0" hangingPunct="1">
+              <a:lnSpc>
+                <a:spcPct val="90000"/>
+              </a:lnSpc>
+              <a:spcBef>
+                <a:spcPts val="500"/>
+              </a:spcBef>
+              <a:buFont typeface="Arial" panose="020B0604020202020204" pitchFamily="34" charset="0"/>
+              <a:buNone/>
+              <a:defRPr sz="1600" kern="1200">
+                <a:solidFill>
+                  <a:schemeClr val="tx1"/>
+                </a:solidFill>
+                <a:latin typeface="+mn-lt"/>
+                <a:ea typeface="+mn-ea"/>
+                <a:cs typeface="+mn-cs"/>
+              </a:defRPr>
+            </a:lvl6pPr>
+            <a:lvl7pPr marL="2743200" indent="0" algn="ctr" defTabSz="914400" rtl="0" eaLnBrk="1" latinLnBrk="0" hangingPunct="1">
+              <a:lnSpc>
+                <a:spcPct val="90000"/>
+              </a:lnSpc>
+              <a:spcBef>
+                <a:spcPts val="500"/>
+              </a:spcBef>
+              <a:buFont typeface="Arial" panose="020B0604020202020204" pitchFamily="34" charset="0"/>
+              <a:buNone/>
+              <a:defRPr sz="1600" kern="1200">
+                <a:solidFill>
+                  <a:schemeClr val="tx1"/>
+                </a:solidFill>
+                <a:latin typeface="+mn-lt"/>
+                <a:ea typeface="+mn-ea"/>
+                <a:cs typeface="+mn-cs"/>
+              </a:defRPr>
+            </a:lvl7pPr>
+            <a:lvl8pPr marL="3200400" indent="0" algn="ctr" defTabSz="914400" rtl="0" eaLnBrk="1" latinLnBrk="0" hangingPunct="1">
+              <a:lnSpc>
+                <a:spcPct val="90000"/>
+              </a:lnSpc>
+              <a:spcBef>
+                <a:spcPts val="500"/>
+              </a:spcBef>
+              <a:buFont typeface="Arial" panose="020B0604020202020204" pitchFamily="34" charset="0"/>
+              <a:buNone/>
+              <a:defRPr sz="1600" kern="1200">
+                <a:solidFill>
+                  <a:schemeClr val="tx1"/>
+                </a:solidFill>
+                <a:latin typeface="+mn-lt"/>
+                <a:ea typeface="+mn-ea"/>
+                <a:cs typeface="+mn-cs"/>
+              </a:defRPr>
+            </a:lvl8pPr>
+            <a:lvl9pPr marL="3657600" indent="0" algn="ctr" defTabSz="914400" rtl="0" eaLnBrk="1" latinLnBrk="0" hangingPunct="1">
+              <a:lnSpc>
+                <a:spcPct val="90000"/>
+              </a:lnSpc>
+              <a:spcBef>
+                <a:spcPts val="500"/>
+              </a:spcBef>
+              <a:buFont typeface="Arial" panose="020B0604020202020204" pitchFamily="34" charset="0"/>
+              <a:buNone/>
+              <a:defRPr sz="1600" kern="1200">
+                <a:solidFill>
+                  <a:schemeClr val="tx1"/>
+                </a:solidFill>
+                <a:latin typeface="+mn-lt"/>
+                <a:ea typeface="+mn-ea"/>
+                <a:cs typeface="+mn-cs"/>
+              </a:defRPr>
+            </a:lvl9pPr>
+          </a:lstStyle>
+          <a:p>
+            <a:pPr algn="r"/>
+            <a:r>
+              <a:rPr lang="es-MX" sz="2000" b="1" dirty="0">
+                <a:solidFill>
+                  <a:srgbClr val="FFFFFF"/>
+                </a:solidFill>
+              </a:rPr>
+              <a:t>Collaborators:</a:t>
+            </a:r>
+          </a:p>
+          <a:p>
+            <a:pPr algn="r"/>
+            <a:r>
+              <a:rPr lang="es-MX" sz="2000" dirty="0">
+                <a:solidFill>
+                  <a:srgbClr val="FFFFFF"/>
+                </a:solidFill>
+              </a:rPr>
+              <a:t>Fernando Herrera Garza</a:t>
+            </a:r>
+          </a:p>
+        </p:txBody>
+      </p:sp>
     </p:spTree>
     <p:extLst>
       <p:ext uri="{BB962C8B-B14F-4D97-AF65-F5344CB8AC3E}">
@@ -5622,13 +5856,13 @@
         </p:nvSpPr>
         <p:spPr>
           <a:xfrm>
-            <a:off x="6723900" y="623186"/>
-            <a:ext cx="4685916" cy="5974415"/>
+            <a:off x="6655638" y="584132"/>
+            <a:ext cx="4754178" cy="6073429"/>
           </a:xfrm>
         </p:spPr>
         <p:txBody>
           <a:bodyPr anchor="ctr">
-            <a:normAutofit fontScale="92500" lnSpcReduction="10000"/>
+            <a:normAutofit lnSpcReduction="10000"/>
           </a:bodyPr>
           <a:lstStyle/>
           <a:p>
@@ -5662,7 +5896,7 @@
           </a:p>
           <a:p>
             <a:r>
-              <a:rPr lang="es-MX" sz="1600" b="0" dirty="0">
+              <a:rPr lang="es-MX" sz="1600" b="1" dirty="0">
                 <a:solidFill>
                   <a:schemeClr val="tx1">
                     <a:lumMod val="50000"/>
@@ -5680,7 +5914,7 @@
             <a:pPr marL="0" indent="0">
               <a:buNone/>
             </a:pPr>
-            <a:endParaRPr lang="es-MX" sz="1600" b="0" dirty="0">
+            <a:endParaRPr lang="es-MX" sz="1600" b="1" dirty="0">
               <a:solidFill>
                 <a:schemeClr val="tx1">
                   <a:lumMod val="50000"/>
@@ -5694,7 +5928,7 @@
           </a:p>
           <a:p>
             <a:r>
-              <a:rPr lang="es-MX" sz="1600" b="0" dirty="0">
+              <a:rPr lang="es-MX" sz="1600" b="1" dirty="0">
                 <a:solidFill>
                   <a:schemeClr val="tx1">
                     <a:lumMod val="50000"/>
@@ -5705,11 +5939,11 @@
                 <a:latin typeface="Microsoft YaHei" panose="020B0503020204020204" pitchFamily="34" charset="-122"/>
                 <a:ea typeface="Microsoft YaHei" panose="020B0503020204020204" pitchFamily="34" charset="-122"/>
               </a:rPr>
-              <a:t>Most popular productAgrupationID based on the total number of cases ordered.</a:t>
+              <a:t>Most popular product agrupation ID based on the total number of cases ordered.</a:t>
             </a:r>
           </a:p>
           <a:p>
-            <a:endParaRPr lang="es-MX" sz="1600" b="0" dirty="0">
+            <a:endParaRPr lang="es-MX" sz="1600" b="1" dirty="0">
               <a:solidFill>
                 <a:schemeClr val="tx1">
                   <a:lumMod val="50000"/>
@@ -5723,7 +5957,7 @@
           </a:p>
           <a:p>
             <a:r>
-              <a:rPr lang="es-MX" sz="1600" b="0" dirty="0">
+              <a:rPr lang="es-MX" sz="1600" b="1" dirty="0">
                 <a:solidFill>
                   <a:schemeClr val="tx1">
                     <a:lumMod val="50000"/>
@@ -5734,14 +5968,14 @@
                 <a:latin typeface="Microsoft YaHei" panose="020B0503020204020204" pitchFamily="34" charset="-122"/>
                 <a:ea typeface="Microsoft YaHei" panose="020B0503020204020204" pitchFamily="34" charset="-122"/>
               </a:rPr>
-              <a:t>Most ordered product ID of each productAgrupationID.</a:t>
+              <a:t>Most ordered product ID of each product agrupation ID.</a:t>
             </a:r>
           </a:p>
           <a:p>
             <a:pPr marL="0" indent="0">
               <a:buNone/>
             </a:pPr>
-            <a:endParaRPr lang="es-MX" sz="1600" b="0" dirty="0">
+            <a:endParaRPr lang="es-MX" sz="1600" b="1" dirty="0">
               <a:solidFill>
                 <a:schemeClr val="tx1">
                   <a:lumMod val="50000"/>
@@ -5755,7 +5989,7 @@
           </a:p>
           <a:p>
             <a:r>
-              <a:rPr lang="es-MX" sz="1600" dirty="0">
+              <a:rPr lang="es-MX" sz="1600" b="1" dirty="0">
                 <a:solidFill>
                   <a:schemeClr val="tx1">
                     <a:lumMod val="50000"/>
@@ -5768,7 +6002,7 @@
               <a:t>S</a:t>
             </a:r>
             <a:r>
-              <a:rPr lang="es-MX" sz="1600" b="0" dirty="0">
+              <a:rPr lang="es-MX" sz="1600" b="1" dirty="0">
                 <a:solidFill>
                   <a:schemeClr val="tx1">
                     <a:lumMod val="50000"/>
@@ -5786,7 +6020,7 @@
             <a:pPr marL="0" indent="0">
               <a:buNone/>
             </a:pPr>
-            <a:endParaRPr lang="es-MX" sz="1600" b="0" dirty="0">
+            <a:endParaRPr lang="es-MX" sz="1600" b="1" dirty="0">
               <a:solidFill>
                 <a:schemeClr val="tx1">
                   <a:lumMod val="50000"/>
@@ -5800,7 +6034,7 @@
           </a:p>
           <a:p>
             <a:r>
-              <a:rPr lang="es-MX" sz="1600" b="0" dirty="0">
+              <a:rPr lang="es-MX" sz="1600" b="1" dirty="0">
                 <a:solidFill>
                   <a:schemeClr val="tx1">
                     <a:lumMod val="50000"/>
@@ -5811,7 +6045,7 @@
                 <a:latin typeface="Microsoft YaHei" panose="020B0503020204020204" pitchFamily="34" charset="-122"/>
                 <a:ea typeface="Microsoft YaHei" panose="020B0503020204020204" pitchFamily="34" charset="-122"/>
               </a:rPr>
-              <a:t>Notable patterns or trends in the productAgrupationID with high sales volume.</a:t>
+              <a:t>Notable patterns or trends in the product agrupation ID with high sales volume.</a:t>
             </a:r>
           </a:p>
           <a:p>
@@ -7441,7 +7675,7 @@
                 <a:latin typeface="Microsoft YaHei" panose="020B0503020204020204" pitchFamily="34" charset="-122"/>
                 <a:ea typeface="Microsoft YaHei" panose="020B0503020204020204" pitchFamily="34" charset="-122"/>
               </a:rPr>
-              <a:t>Negative values in the Product Cases Ordered column.</a:t>
+              <a:t>Negative values in the product cases ordered column.</a:t>
             </a:r>
             <a:endParaRPr lang="es-MX" sz="1200" b="1" dirty="0">
               <a:solidFill>
@@ -7685,7 +7919,7 @@
                   <a:schemeClr val="bg1"/>
                 </a:solidFill>
               </a:rPr>
-              <a:t>Territory</a:t>
+              <a:t>territory</a:t>
             </a:r>
             <a:r>
               <a:rPr lang="es-MX" sz="2800" dirty="0">
@@ -7703,7 +7937,7 @@
                 <a:latin typeface="Microsoft YaHei" panose="020B0503020204020204" pitchFamily="34" charset="-122"/>
                 <a:ea typeface="Microsoft YaHei" panose="020B0503020204020204" pitchFamily="34" charset="-122"/>
               </a:rPr>
-              <a:t>Product Cases Ordered</a:t>
+              <a:t>product cases ordered</a:t>
             </a:r>
             <a:r>
               <a:rPr lang="es-MX" sz="2800" dirty="0">
@@ -7711,7 +7945,7 @@
                   <a:schemeClr val="bg1"/>
                 </a:solidFill>
               </a:rPr>
-              <a:t> columns, involving the assignment of a region to each Territory and the adjustment of the Product Cases Ordered since the values consisted on mostly non-integers.</a:t>
+              <a:t> fields, involving the assignment of a geographical region to each territory and the adjustment of the product cases ordered since the values consisted of mostly non-integers.</a:t>
             </a:r>
             <a:endParaRPr lang="es-MX" sz="1200" dirty="0">
               <a:solidFill>
@@ -8874,36 +9108,6 @@
           </a:p>
         </p:txBody>
       </p:sp>
-      <p:pic>
-        <p:nvPicPr>
-          <p:cNvPr id="9" name="Imagen 8">
-            <a:extLst>
-              <a:ext uri="{FF2B5EF4-FFF2-40B4-BE49-F238E27FC236}">
-                <a16:creationId xmlns:a16="http://schemas.microsoft.com/office/drawing/2014/main" id="{F6CDD78A-670F-9DB7-A066-94204613BC38}"/>
-              </a:ext>
-            </a:extLst>
-          </p:cNvPr>
-          <p:cNvPicPr>
-            <a:picLocks noChangeAspect="1"/>
-          </p:cNvPicPr>
-          <p:nvPr/>
-        </p:nvPicPr>
-        <p:blipFill>
-          <a:blip r:embed="rId2"/>
-          <a:stretch>
-            <a:fillRect/>
-          </a:stretch>
-        </p:blipFill>
-        <p:spPr>
-          <a:xfrm>
-            <a:off x="6096000" y="639909"/>
-            <a:ext cx="5779910" cy="5472021"/>
-          </a:xfrm>
-          <a:prstGeom prst="rect">
-            <a:avLst/>
-          </a:prstGeom>
-        </p:spPr>
-      </p:pic>
       <p:sp>
         <p:nvSpPr>
           <p:cNvPr id="11" name="Título 1">
@@ -9153,7 +9357,7 @@
                 <a:latin typeface="Microsoft YaHei" panose="020B0503020204020204" pitchFamily="34" charset="-122"/>
                 <a:ea typeface="Microsoft YaHei" panose="020B0503020204020204" pitchFamily="34" charset="-122"/>
               </a:rPr>
-              <a:t> where the five with the most orderes placed during January.</a:t>
+              <a:t> were the five with the most orders placed during January.</a:t>
             </a:r>
             <a:endParaRPr lang="es-MX" sz="2400" b="0" dirty="0">
               <a:solidFill>
@@ -9168,6 +9372,126 @@
           </a:p>
         </p:txBody>
       </p:sp>
+      <p:sp>
+        <p:nvSpPr>
+          <p:cNvPr id="15" name="Título 1">
+            <a:extLst>
+              <a:ext uri="{FF2B5EF4-FFF2-40B4-BE49-F238E27FC236}">
+                <a16:creationId xmlns:a16="http://schemas.microsoft.com/office/drawing/2014/main" id="{419F0115-F664-01E8-E4E8-A8006F0CC34B}"/>
+              </a:ext>
+            </a:extLst>
+          </p:cNvPr>
+          <p:cNvSpPr txBox="1">
+            <a:spLocks/>
+          </p:cNvSpPr>
+          <p:nvPr/>
+        </p:nvSpPr>
+        <p:spPr>
+          <a:xfrm>
+            <a:off x="6535595" y="5189620"/>
+            <a:ext cx="4818610" cy="1873192"/>
+          </a:xfrm>
+          <a:prstGeom prst="rect">
+            <a:avLst/>
+          </a:prstGeom>
+        </p:spPr>
+        <p:txBody>
+          <a:bodyPr vert="horz" lIns="91440" tIns="45720" rIns="91440" bIns="45720" rtlCol="0" anchor="ctr">
+            <a:normAutofit/>
+          </a:bodyPr>
+          <a:lstStyle>
+            <a:lvl1pPr algn="l" defTabSz="914400" rtl="0" eaLnBrk="1" latinLnBrk="0" hangingPunct="1">
+              <a:lnSpc>
+                <a:spcPct val="90000"/>
+              </a:lnSpc>
+              <a:spcBef>
+                <a:spcPct val="0"/>
+              </a:spcBef>
+              <a:buNone/>
+              <a:defRPr sz="4800" kern="1200">
+                <a:solidFill>
+                  <a:schemeClr val="tx1"/>
+                </a:solidFill>
+                <a:latin typeface="+mj-lt"/>
+                <a:ea typeface="+mj-ea"/>
+                <a:cs typeface="+mj-cs"/>
+              </a:defRPr>
+            </a:lvl1pPr>
+          </a:lstStyle>
+          <a:p>
+            <a:r>
+              <a:rPr lang="es-MX" sz="2000" dirty="0">
+                <a:solidFill>
+                  <a:schemeClr val="tx1">
+                    <a:lumMod val="50000"/>
+                    <a:lumOff val="50000"/>
+                  </a:schemeClr>
+                </a:solidFill>
+                <a:latin typeface="Microsoft YaHei" panose="020B0503020204020204" pitchFamily="34" charset="-122"/>
+                <a:ea typeface="Microsoft YaHei" panose="020B0503020204020204" pitchFamily="34" charset="-122"/>
+              </a:rPr>
+              <a:t>4 of these customers are located in a border state of Mexico:</a:t>
+            </a:r>
+          </a:p>
+          <a:p>
+            <a:r>
+              <a:rPr lang="es-MX" sz="2000" b="1" dirty="0">
+                <a:solidFill>
+                  <a:schemeClr val="tx1">
+                    <a:lumMod val="50000"/>
+                    <a:lumOff val="50000"/>
+                  </a:schemeClr>
+                </a:solidFill>
+                <a:latin typeface="Microsoft YaHei" panose="020B0503020204020204" pitchFamily="34" charset="-122"/>
+                <a:ea typeface="Microsoft YaHei" panose="020B0503020204020204" pitchFamily="34" charset="-122"/>
+              </a:rPr>
+              <a:t>Durango, Chihuahua, Nuevo León, Sonora, and Baja California Norte.</a:t>
+            </a:r>
+          </a:p>
+          <a:p>
+            <a:endParaRPr lang="es-MX" sz="2400" b="0" dirty="0">
+              <a:solidFill>
+                <a:schemeClr val="bg1">
+                  <a:lumMod val="95000"/>
+                </a:schemeClr>
+              </a:solidFill>
+              <a:effectLst/>
+              <a:latin typeface="Microsoft YaHei" panose="020B0503020204020204" pitchFamily="34" charset="-122"/>
+              <a:ea typeface="Microsoft YaHei" panose="020B0503020204020204" pitchFamily="34" charset="-122"/>
+            </a:endParaRPr>
+          </a:p>
+        </p:txBody>
+      </p:sp>
+      <p:pic>
+        <p:nvPicPr>
+          <p:cNvPr id="20" name="Imagen 19">
+            <a:extLst>
+              <a:ext uri="{FF2B5EF4-FFF2-40B4-BE49-F238E27FC236}">
+                <a16:creationId xmlns:a16="http://schemas.microsoft.com/office/drawing/2014/main" id="{719BEE50-DB17-B30A-23FB-A4E46BDE09AE}"/>
+              </a:ext>
+            </a:extLst>
+          </p:cNvPr>
+          <p:cNvPicPr>
+            <a:picLocks noChangeAspect="1"/>
+          </p:cNvPicPr>
+          <p:nvPr/>
+        </p:nvPicPr>
+        <p:blipFill>
+          <a:blip r:embed="rId2"/>
+          <a:stretch>
+            <a:fillRect/>
+          </a:stretch>
+        </p:blipFill>
+        <p:spPr>
+          <a:xfrm>
+            <a:off x="6817239" y="251800"/>
+            <a:ext cx="4165382" cy="4959811"/>
+          </a:xfrm>
+          <a:prstGeom prst="rect">
+            <a:avLst/>
+          </a:prstGeom>
+        </p:spPr>
+      </p:pic>
     </p:spTree>
     <p:extLst>
       <p:ext uri="{BB962C8B-B14F-4D97-AF65-F5344CB8AC3E}">
@@ -9291,7 +9615,7 @@
                                           </p:stCondLst>
                                         </p:cTn>
                                         <p:tgtEl>
-                                          <p:spTgt spid="9"/>
+                                          <p:spTgt spid="20"/>
                                         </p:tgtEl>
                                         <p:attrNameLst>
                                           <p:attrName>style.visibility</p:attrName>
@@ -9305,7 +9629,7 @@
                                       <p:cBhvr>
                                         <p:cTn id="13" dur="500"/>
                                         <p:tgtEl>
-                                          <p:spTgt spid="9"/>
+                                          <p:spTgt spid="20"/>
                                         </p:tgtEl>
                                       </p:cBhvr>
                                     </p:animEffect>
@@ -9371,6 +9695,59 @@
                       </p:childTnLst>
                     </p:cTn>
                   </p:par>
+                  <p:par>
+                    <p:cTn id="19" fill="hold">
+                      <p:stCondLst>
+                        <p:cond delay="indefinite"/>
+                      </p:stCondLst>
+                      <p:childTnLst>
+                        <p:par>
+                          <p:cTn id="20" fill="hold">
+                            <p:stCondLst>
+                              <p:cond delay="0"/>
+                            </p:stCondLst>
+                            <p:childTnLst>
+                              <p:par>
+                                <p:cTn id="21" presetID="9" presetClass="entr" presetSubtype="0" fill="hold" grpId="0" nodeType="clickEffect">
+                                  <p:stCondLst>
+                                    <p:cond delay="0"/>
+                                  </p:stCondLst>
+                                  <p:childTnLst>
+                                    <p:set>
+                                      <p:cBhvr>
+                                        <p:cTn id="22" dur="1" fill="hold">
+                                          <p:stCondLst>
+                                            <p:cond delay="0"/>
+                                          </p:stCondLst>
+                                        </p:cTn>
+                                        <p:tgtEl>
+                                          <p:spTgt spid="15"/>
+                                        </p:tgtEl>
+                                        <p:attrNameLst>
+                                          <p:attrName>style.visibility</p:attrName>
+                                        </p:attrNameLst>
+                                      </p:cBhvr>
+                                      <p:to>
+                                        <p:strVal val="visible"/>
+                                      </p:to>
+                                    </p:set>
+                                    <p:animEffect transition="in" filter="dissolve">
+                                      <p:cBhvr>
+                                        <p:cTn id="23" dur="500"/>
+                                        <p:tgtEl>
+                                          <p:spTgt spid="15"/>
+                                        </p:tgtEl>
+                                      </p:cBhvr>
+                                    </p:animEffect>
+                                  </p:childTnLst>
+                                </p:cTn>
+                              </p:par>
+                            </p:childTnLst>
+                          </p:cTn>
+                        </p:par>
+                      </p:childTnLst>
+                    </p:cTn>
+                  </p:par>
                 </p:childTnLst>
               </p:cTn>
               <p:prevCondLst>
@@ -9395,6 +9772,7 @@
     <p:bldLst>
       <p:bldP spid="5" grpId="0"/>
       <p:bldP spid="13" grpId="0"/>
+      <p:bldP spid="15" grpId="0"/>
     </p:bldLst>
   </p:timing>
 </p:sld>
@@ -10186,19 +10564,7 @@
                 <a:latin typeface="Microsoft YaHei" panose="020B0503020204020204" pitchFamily="34" charset="-122"/>
                 <a:ea typeface="Microsoft YaHei" panose="020B0503020204020204" pitchFamily="34" charset="-122"/>
               </a:rPr>
-              <a:t>Most popular productAgrupationID based on the total </a:t>
-            </a:r>
-          </a:p>
-          <a:p>
-            <a:r>
-              <a:rPr lang="es-MX" sz="2800" dirty="0">
-                <a:solidFill>
-                  <a:schemeClr val="bg1"/>
-                </a:solidFill>
-                <a:latin typeface="Microsoft YaHei" panose="020B0503020204020204" pitchFamily="34" charset="-122"/>
-                <a:ea typeface="Microsoft YaHei" panose="020B0503020204020204" pitchFamily="34" charset="-122"/>
-              </a:rPr>
-              <a:t>number of cases ordered.</a:t>
+              <a:t>Most popular product agrupation ID based on the total number of cases ordered.</a:t>
             </a:r>
             <a:endParaRPr lang="es-MX" sz="2800" b="0" dirty="0">
               <a:solidFill>
@@ -10340,7 +10706,7 @@
                 <a:latin typeface="Microsoft YaHei" panose="020B0503020204020204" pitchFamily="34" charset="-122"/>
                 <a:ea typeface="Microsoft YaHei" panose="020B0503020204020204" pitchFamily="34" charset="-122"/>
               </a:rPr>
-              <a:t>Product Agrupation ID </a:t>
+              <a:t>Product agrupation ID </a:t>
             </a:r>
             <a:r>
               <a:rPr lang="es-MX" sz="2400" b="1" dirty="0">
@@ -11417,7 +11783,19 @@
                 <a:latin typeface="Microsoft YaHei" panose="020B0503020204020204" pitchFamily="34" charset="-122"/>
                 <a:ea typeface="Microsoft YaHei" panose="020B0503020204020204" pitchFamily="34" charset="-122"/>
               </a:rPr>
-              <a:t>Most ordered product ID of each productAgrupationID.</a:t>
+              <a:t>Most ordered product ID of each product </a:t>
+            </a:r>
+          </a:p>
+          <a:p>
+            <a:r>
+              <a:rPr lang="es-MX" sz="2800" dirty="0">
+                <a:solidFill>
+                  <a:schemeClr val="bg1"/>
+                </a:solidFill>
+                <a:latin typeface="Microsoft YaHei" panose="020B0503020204020204" pitchFamily="34" charset="-122"/>
+                <a:ea typeface="Microsoft YaHei" panose="020B0503020204020204" pitchFamily="34" charset="-122"/>
+              </a:rPr>
+              <a:t>agrupation ID.</a:t>
             </a:r>
           </a:p>
         </p:txBody>
@@ -11510,7 +11888,7 @@
         </p:nvSpPr>
         <p:spPr>
           <a:xfrm>
-            <a:off x="671553" y="4125204"/>
+            <a:off x="671553" y="3960314"/>
             <a:ext cx="4818610" cy="2308712"/>
           </a:xfrm>
           <a:prstGeom prst="rect">
@@ -11585,6 +11963,66 @@
           </a:prstGeom>
         </p:spPr>
       </p:pic>
+      <p:sp>
+        <p:nvSpPr>
+          <p:cNvPr id="9" name="Título 1">
+            <a:extLst>
+              <a:ext uri="{FF2B5EF4-FFF2-40B4-BE49-F238E27FC236}">
+                <a16:creationId xmlns:a16="http://schemas.microsoft.com/office/drawing/2014/main" id="{09BF9F47-BFB4-97A0-5CFA-B9DA68021BA1}"/>
+              </a:ext>
+            </a:extLst>
+          </p:cNvPr>
+          <p:cNvSpPr txBox="1">
+            <a:spLocks/>
+          </p:cNvSpPr>
+          <p:nvPr/>
+        </p:nvSpPr>
+        <p:spPr>
+          <a:xfrm>
+            <a:off x="671553" y="6048820"/>
+            <a:ext cx="4818610" cy="678462"/>
+          </a:xfrm>
+          <a:prstGeom prst="rect">
+            <a:avLst/>
+          </a:prstGeom>
+        </p:spPr>
+        <p:txBody>
+          <a:bodyPr vert="horz" lIns="91440" tIns="45720" rIns="91440" bIns="45720" rtlCol="0" anchor="ctr">
+            <a:noAutofit/>
+          </a:bodyPr>
+          <a:lstStyle>
+            <a:lvl1pPr algn="l" defTabSz="914400" rtl="0" eaLnBrk="1" latinLnBrk="0" hangingPunct="1">
+              <a:lnSpc>
+                <a:spcPct val="90000"/>
+              </a:lnSpc>
+              <a:spcBef>
+                <a:spcPct val="0"/>
+              </a:spcBef>
+              <a:buNone/>
+              <a:defRPr sz="4800" kern="1200">
+                <a:solidFill>
+                  <a:schemeClr val="tx1"/>
+                </a:solidFill>
+                <a:latin typeface="+mj-lt"/>
+                <a:ea typeface="+mj-ea"/>
+                <a:cs typeface="+mj-cs"/>
+              </a:defRPr>
+            </a:lvl1pPr>
+          </a:lstStyle>
+          <a:p>
+            <a:r>
+              <a:rPr lang="es-MX" sz="2800" b="1" dirty="0">
+                <a:solidFill>
+                  <a:schemeClr val="bg1"/>
+                </a:solidFill>
+                <a:latin typeface="Microsoft YaHei" panose="020B0503020204020204" pitchFamily="34" charset="-122"/>
+                <a:ea typeface="Microsoft YaHei" panose="020B0503020204020204" pitchFamily="34" charset="-122"/>
+              </a:rPr>
+              <a:t>*</a:t>
+            </a:r>
+          </a:p>
+        </p:txBody>
+      </p:sp>
     </p:spTree>
     <p:extLst>
       <p:ext uri="{BB962C8B-B14F-4D97-AF65-F5344CB8AC3E}">
@@ -12696,7 +13134,7 @@
         </p:nvSpPr>
         <p:spPr>
           <a:xfrm>
-            <a:off x="671553" y="4125204"/>
+            <a:off x="671553" y="3990294"/>
             <a:ext cx="4818610" cy="2308712"/>
           </a:xfrm>
           <a:prstGeom prst="rect">
@@ -12737,7 +13175,79 @@
                 <a:latin typeface="Microsoft YaHei" panose="020B0503020204020204" pitchFamily="34" charset="-122"/>
                 <a:ea typeface="Microsoft YaHei" panose="020B0503020204020204" pitchFamily="34" charset="-122"/>
               </a:rPr>
-              <a:t>In Mexico, the state of Sonora showed the highest sales, while in USA Texas dominated. In South America, Argentina generated the most sales.</a:t>
+              <a:t>In Mexico, the state of </a:t>
+            </a:r>
+            <a:r>
+              <a:rPr lang="es-MX" sz="2400" b="1" dirty="0">
+                <a:solidFill>
+                  <a:schemeClr val="bg1">
+                    <a:lumMod val="95000"/>
+                  </a:schemeClr>
+                </a:solidFill>
+                <a:latin typeface="Microsoft YaHei" panose="020B0503020204020204" pitchFamily="34" charset="-122"/>
+                <a:ea typeface="Microsoft YaHei" panose="020B0503020204020204" pitchFamily="34" charset="-122"/>
+              </a:rPr>
+              <a:t>Sonora</a:t>
+            </a:r>
+            <a:r>
+              <a:rPr lang="es-MX" sz="2400" dirty="0">
+                <a:solidFill>
+                  <a:schemeClr val="bg1">
+                    <a:lumMod val="95000"/>
+                  </a:schemeClr>
+                </a:solidFill>
+                <a:latin typeface="Microsoft YaHei" panose="020B0503020204020204" pitchFamily="34" charset="-122"/>
+                <a:ea typeface="Microsoft YaHei" panose="020B0503020204020204" pitchFamily="34" charset="-122"/>
+              </a:rPr>
+              <a:t> showed the highest sales, while in USA </a:t>
+            </a:r>
+            <a:r>
+              <a:rPr lang="es-MX" sz="2400" b="1" dirty="0">
+                <a:solidFill>
+                  <a:schemeClr val="bg1">
+                    <a:lumMod val="95000"/>
+                  </a:schemeClr>
+                </a:solidFill>
+                <a:latin typeface="Microsoft YaHei" panose="020B0503020204020204" pitchFamily="34" charset="-122"/>
+                <a:ea typeface="Microsoft YaHei" panose="020B0503020204020204" pitchFamily="34" charset="-122"/>
+              </a:rPr>
+              <a:t>Texas</a:t>
+            </a:r>
+            <a:r>
+              <a:rPr lang="es-MX" sz="2400" dirty="0">
+                <a:solidFill>
+                  <a:schemeClr val="bg1">
+                    <a:lumMod val="95000"/>
+                  </a:schemeClr>
+                </a:solidFill>
+                <a:latin typeface="Microsoft YaHei" panose="020B0503020204020204" pitchFamily="34" charset="-122"/>
+                <a:ea typeface="Microsoft YaHei" panose="020B0503020204020204" pitchFamily="34" charset="-122"/>
+              </a:rPr>
+              <a:t> dominated. In South America, </a:t>
+            </a:r>
+            <a:r>
+              <a:rPr lang="es-MX" sz="2400" b="1" dirty="0">
+                <a:solidFill>
+                  <a:schemeClr val="bg1">
+                    <a:lumMod val="95000"/>
+                  </a:schemeClr>
+                </a:solidFill>
+                <a:latin typeface="Microsoft YaHei" panose="020B0503020204020204" pitchFamily="34" charset="-122"/>
+                <a:ea typeface="Microsoft YaHei" panose="020B0503020204020204" pitchFamily="34" charset="-122"/>
+              </a:rPr>
+              <a:t>Argentina</a:t>
+            </a:r>
+            <a:r>
+              <a:rPr lang="es-MX" sz="2400" dirty="0">
+                <a:solidFill>
+                  <a:schemeClr val="bg1">
+                    <a:lumMod val="95000"/>
+                  </a:schemeClr>
+                </a:solidFill>
+                <a:latin typeface="Microsoft YaHei" panose="020B0503020204020204" pitchFamily="34" charset="-122"/>
+                <a:ea typeface="Microsoft YaHei" panose="020B0503020204020204" pitchFamily="34" charset="-122"/>
+              </a:rPr>
+              <a:t> generated the most sales.</a:t>
             </a:r>
           </a:p>
         </p:txBody>
@@ -12804,10 +13314,10 @@
       </p:pic>
       <p:pic>
         <p:nvPicPr>
-          <p:cNvPr id="21" name="Imagen 20">
-            <a:extLst>
-              <a:ext uri="{FF2B5EF4-FFF2-40B4-BE49-F238E27FC236}">
-                <a16:creationId xmlns:a16="http://schemas.microsoft.com/office/drawing/2014/main" id="{F61CC35A-BF21-91E5-EB73-8350D3D8887B}"/>
+          <p:cNvPr id="23" name="Imagen 22">
+            <a:extLst>
+              <a:ext uri="{FF2B5EF4-FFF2-40B4-BE49-F238E27FC236}">
+                <a16:creationId xmlns:a16="http://schemas.microsoft.com/office/drawing/2014/main" id="{5D54E85B-7559-1A18-865B-9E3AAD524B55}"/>
               </a:ext>
             </a:extLst>
           </p:cNvPr>
@@ -12824,14 +13334,74 @@
         </p:blipFill>
         <p:spPr>
           <a:xfrm>
-            <a:off x="8829490" y="53879"/>
-            <a:ext cx="2911327" cy="3131315"/>
+            <a:off x="8813217" y="267348"/>
+            <a:ext cx="2878687" cy="2355931"/>
           </a:xfrm>
           <a:prstGeom prst="rect">
             <a:avLst/>
           </a:prstGeom>
         </p:spPr>
       </p:pic>
+      <p:sp>
+        <p:nvSpPr>
+          <p:cNvPr id="24" name="Título 1">
+            <a:extLst>
+              <a:ext uri="{FF2B5EF4-FFF2-40B4-BE49-F238E27FC236}">
+                <a16:creationId xmlns:a16="http://schemas.microsoft.com/office/drawing/2014/main" id="{56E33376-F974-400F-CF95-5B0FD1451BCF}"/>
+              </a:ext>
+            </a:extLst>
+          </p:cNvPr>
+          <p:cNvSpPr txBox="1">
+            <a:spLocks/>
+          </p:cNvSpPr>
+          <p:nvPr/>
+        </p:nvSpPr>
+        <p:spPr>
+          <a:xfrm>
+            <a:off x="671553" y="6048820"/>
+            <a:ext cx="4818610" cy="678462"/>
+          </a:xfrm>
+          <a:prstGeom prst="rect">
+            <a:avLst/>
+          </a:prstGeom>
+        </p:spPr>
+        <p:txBody>
+          <a:bodyPr vert="horz" lIns="91440" tIns="45720" rIns="91440" bIns="45720" rtlCol="0" anchor="ctr">
+            <a:noAutofit/>
+          </a:bodyPr>
+          <a:lstStyle>
+            <a:lvl1pPr algn="l" defTabSz="914400" rtl="0" eaLnBrk="1" latinLnBrk="0" hangingPunct="1">
+              <a:lnSpc>
+                <a:spcPct val="90000"/>
+              </a:lnSpc>
+              <a:spcBef>
+                <a:spcPct val="0"/>
+              </a:spcBef>
+              <a:buNone/>
+              <a:defRPr sz="4800" kern="1200">
+                <a:solidFill>
+                  <a:schemeClr val="tx1"/>
+                </a:solidFill>
+                <a:latin typeface="+mj-lt"/>
+                <a:ea typeface="+mj-ea"/>
+                <a:cs typeface="+mj-cs"/>
+              </a:defRPr>
+            </a:lvl1pPr>
+          </a:lstStyle>
+          <a:p>
+            <a:r>
+              <a:rPr lang="es-MX" sz="2800" b="1" dirty="0">
+                <a:solidFill>
+                  <a:schemeClr val="bg1"/>
+                </a:solidFill>
+                <a:latin typeface="Microsoft YaHei" panose="020B0503020204020204" pitchFamily="34" charset="-122"/>
+                <a:ea typeface="Microsoft YaHei" panose="020B0503020204020204" pitchFamily="34" charset="-122"/>
+              </a:rPr>
+              <a:t>*</a:t>
+            </a:r>
+          </a:p>
+        </p:txBody>
+      </p:sp>
     </p:spTree>
     <p:extLst>
       <p:ext uri="{BB962C8B-B14F-4D97-AF65-F5344CB8AC3E}">
@@ -12955,7 +13525,7 @@
                                           </p:stCondLst>
                                         </p:cTn>
                                         <p:tgtEl>
-                                          <p:spTgt spid="15"/>
+                                          <p:spTgt spid="23"/>
                                         </p:tgtEl>
                                         <p:attrNameLst>
                                           <p:attrName>style.visibility</p:attrName>
@@ -12969,7 +13539,7 @@
                                       <p:cBhvr>
                                         <p:cTn id="13" dur="500"/>
                                         <p:tgtEl>
-                                          <p:spTgt spid="15"/>
+                                          <p:spTgt spid="23"/>
                                         </p:tgtEl>
                                       </p:cBhvr>
                                     </p:animEffect>
@@ -12990,7 +13560,7 @@
                                           </p:stCondLst>
                                         </p:cTn>
                                         <p:tgtEl>
-                                          <p:spTgt spid="21"/>
+                                          <p:spTgt spid="15"/>
                                         </p:tgtEl>
                                         <p:attrNameLst>
                                           <p:attrName>style.visibility</p:attrName>
@@ -13004,7 +13574,7 @@
                                       <p:cBhvr>
                                         <p:cTn id="16" dur="500"/>
                                         <p:tgtEl>
-                                          <p:spTgt spid="21"/>
+                                          <p:spTgt spid="15"/>
                                         </p:tgtEl>
                                       </p:cBhvr>
                                     </p:animEffect>
@@ -13129,6 +13699,3070 @@
     <p:bldLst>
       <p:bldP spid="5" grpId="0"/>
       <p:bldP spid="13" grpId="0"/>
+    </p:bldLst>
+  </p:timing>
+</p:sld>
+</file>
+
+<file path=ppt/slides/slide8.xml><?xml version="1.0" encoding="utf-8"?>
+<p:sld xmlns:a="http://schemas.openxmlformats.org/drawingml/2006/main" xmlns:r="http://schemas.openxmlformats.org/officeDocument/2006/relationships" xmlns:p="http://schemas.openxmlformats.org/presentationml/2006/main">
+  <p:cSld>
+    <p:bg>
+      <p:bgPr>
+        <a:solidFill>
+          <a:schemeClr val="bg1"/>
+        </a:solidFill>
+        <a:effectLst/>
+      </p:bgPr>
+    </p:bg>
+    <p:spTree>
+      <p:nvGrpSpPr>
+        <p:cNvPr id="1" name=""/>
+        <p:cNvGrpSpPr/>
+        <p:nvPr/>
+      </p:nvGrpSpPr>
+      <p:grpSpPr>
+        <a:xfrm>
+          <a:off x="0" y="0"/>
+          <a:ext cx="0" cy="0"/>
+          <a:chOff x="0" y="0"/>
+          <a:chExt cx="0" cy="0"/>
+        </a:xfrm>
+      </p:grpSpPr>
+      <p:sp useBgFill="1">
+        <p:nvSpPr>
+          <p:cNvPr id="8" name="Rectangle 7">
+            <a:extLst>
+              <a:ext uri="{FF2B5EF4-FFF2-40B4-BE49-F238E27FC236}">
+                <a16:creationId xmlns:a16="http://schemas.microsoft.com/office/drawing/2014/main" id="{A2679492-7988-4050-9056-542444452411}"/>
+              </a:ext>
+              <a:ext uri="{C183D7F6-B498-43B3-948B-1728B52AA6E4}">
+                <adec:decorative xmlns:adec="http://schemas.microsoft.com/office/drawing/2017/decorative" val="1"/>
+              </a:ext>
+            </a:extLst>
+          </p:cNvPr>
+          <p:cNvSpPr>
+            <a:spLocks noGrp="1" noRot="1" noChangeAspect="1" noMove="1" noResize="1" noEditPoints="1" noAdjustHandles="1" noChangeArrowheads="1" noChangeShapeType="1" noTextEdit="1"/>
+          </p:cNvSpPr>
+          <p:nvPr>
+            <p:extLst>
+              <p:ext uri="{386F3935-93C4-4BCD-93E2-E3B085C9AB24}">
+                <p16:designElem xmlns:p16="http://schemas.microsoft.com/office/powerpoint/2015/main" val="1"/>
+              </p:ext>
+            </p:extLst>
+          </p:nvPr>
+        </p:nvSpPr>
+        <p:spPr>
+          <a:xfrm>
+            <a:off x="0" y="0"/>
+            <a:ext cx="12192000" cy="6858000"/>
+          </a:xfrm>
+          <a:prstGeom prst="rect">
+            <a:avLst/>
+          </a:prstGeom>
+          <a:ln>
+            <a:noFill/>
+          </a:ln>
+        </p:spPr>
+        <p:style>
+          <a:lnRef idx="2">
+            <a:schemeClr val="accent1">
+              <a:shade val="50000"/>
+            </a:schemeClr>
+          </a:lnRef>
+          <a:fillRef idx="1">
+            <a:schemeClr val="accent1"/>
+          </a:fillRef>
+          <a:effectRef idx="0">
+            <a:schemeClr val="accent1"/>
+          </a:effectRef>
+          <a:fontRef idx="minor">
+            <a:schemeClr val="lt1"/>
+          </a:fontRef>
+        </p:style>
+        <p:txBody>
+          <a:bodyPr rtlCol="0" anchor="ctr"/>
+          <a:lstStyle/>
+          <a:p>
+            <a:pPr algn="ctr"/>
+            <a:endParaRPr lang="en-US"/>
+          </a:p>
+        </p:txBody>
+      </p:sp>
+      <p:sp>
+        <p:nvSpPr>
+          <p:cNvPr id="10" name="Rectangle 9">
+            <a:extLst>
+              <a:ext uri="{FF2B5EF4-FFF2-40B4-BE49-F238E27FC236}">
+                <a16:creationId xmlns:a16="http://schemas.microsoft.com/office/drawing/2014/main" id="{B091B163-7D61-4891-ABCF-5C13D9C418D0}"/>
+              </a:ext>
+              <a:ext uri="{C183D7F6-B498-43B3-948B-1728B52AA6E4}">
+                <adec:decorative xmlns:adec="http://schemas.microsoft.com/office/drawing/2017/decorative" val="1"/>
+              </a:ext>
+            </a:extLst>
+          </p:cNvPr>
+          <p:cNvSpPr>
+            <a:spLocks noGrp="1" noRot="1" noChangeAspect="1" noMove="1" noResize="1" noEditPoints="1" noAdjustHandles="1" noChangeArrowheads="1" noChangeShapeType="1" noTextEdit="1"/>
+          </p:cNvSpPr>
+          <p:nvPr>
+            <p:extLst>
+              <p:ext uri="{386F3935-93C4-4BCD-93E2-E3B085C9AB24}">
+                <p16:designElem xmlns:p16="http://schemas.microsoft.com/office/powerpoint/2015/main" val="1"/>
+              </p:ext>
+            </p:extLst>
+          </p:nvPr>
+        </p:nvSpPr>
+        <p:spPr>
+          <a:xfrm>
+            <a:off x="0" y="0"/>
+            <a:ext cx="5779911" cy="6858000"/>
+          </a:xfrm>
+          <a:prstGeom prst="rect">
+            <a:avLst/>
+          </a:prstGeom>
+          <a:gradFill flip="none" rotWithShape="1">
+            <a:gsLst>
+              <a:gs pos="100000">
+                <a:schemeClr val="accent4"/>
+              </a:gs>
+              <a:gs pos="0">
+                <a:schemeClr val="accent2"/>
+              </a:gs>
+            </a:gsLst>
+            <a:lin ang="2700000" scaled="1"/>
+            <a:tileRect/>
+          </a:gradFill>
+          <a:ln>
+            <a:noFill/>
+          </a:ln>
+        </p:spPr>
+        <p:style>
+          <a:lnRef idx="2">
+            <a:schemeClr val="accent1">
+              <a:shade val="50000"/>
+            </a:schemeClr>
+          </a:lnRef>
+          <a:fillRef idx="1">
+            <a:schemeClr val="accent1"/>
+          </a:fillRef>
+          <a:effectRef idx="0">
+            <a:schemeClr val="accent1"/>
+          </a:effectRef>
+          <a:fontRef idx="minor">
+            <a:schemeClr val="lt1"/>
+          </a:fontRef>
+        </p:style>
+        <p:txBody>
+          <a:bodyPr rtlCol="0" anchor="ctr"/>
+          <a:lstStyle/>
+          <a:p>
+            <a:pPr algn="ctr"/>
+            <a:endParaRPr lang="en-US"/>
+          </a:p>
+        </p:txBody>
+      </p:sp>
+      <p:sp>
+        <p:nvSpPr>
+          <p:cNvPr id="2" name="Título 1">
+            <a:extLst>
+              <a:ext uri="{FF2B5EF4-FFF2-40B4-BE49-F238E27FC236}">
+                <a16:creationId xmlns:a16="http://schemas.microsoft.com/office/drawing/2014/main" id="{8211168C-4B73-41CB-F139-B2D6E1015BF3}"/>
+              </a:ext>
+            </a:extLst>
+          </p:cNvPr>
+          <p:cNvSpPr>
+            <a:spLocks noGrp="1"/>
+          </p:cNvSpPr>
+          <p:nvPr>
+            <p:ph type="title"/>
+          </p:nvPr>
+        </p:nvSpPr>
+        <p:spPr>
+          <a:xfrm>
+            <a:off x="538942" y="381935"/>
+            <a:ext cx="4287891" cy="1356924"/>
+          </a:xfrm>
+        </p:spPr>
+        <p:txBody>
+          <a:bodyPr anchor="ctr">
+            <a:normAutofit/>
+          </a:bodyPr>
+          <a:lstStyle/>
+          <a:p>
+            <a:r>
+              <a:rPr lang="es-MX" sz="8000" b="1" dirty="0">
+                <a:solidFill>
+                  <a:schemeClr val="bg1"/>
+                </a:solidFill>
+              </a:rPr>
+              <a:t>Insights</a:t>
+            </a:r>
+          </a:p>
+        </p:txBody>
+      </p:sp>
+      <p:sp>
+        <p:nvSpPr>
+          <p:cNvPr id="12" name="Graphic 11">
+            <a:extLst>
+              <a:ext uri="{FF2B5EF4-FFF2-40B4-BE49-F238E27FC236}">
+                <a16:creationId xmlns:a16="http://schemas.microsoft.com/office/drawing/2014/main" id="{6CB927A4-E432-4310-9CD5-E89FF5063179}"/>
+              </a:ext>
+              <a:ext uri="{C183D7F6-B498-43B3-948B-1728B52AA6E4}">
+                <adec:decorative xmlns:adec="http://schemas.microsoft.com/office/drawing/2017/decorative" val="1"/>
+              </a:ext>
+            </a:extLst>
+          </p:cNvPr>
+          <p:cNvSpPr>
+            <a:spLocks noGrp="1" noRot="1" noChangeAspect="1" noMove="1" noResize="1" noEditPoints="1" noAdjustHandles="1" noChangeArrowheads="1" noChangeShapeType="1" noTextEdit="1"/>
+          </p:cNvSpPr>
+          <p:nvPr>
+            <p:extLst>
+              <p:ext uri="{386F3935-93C4-4BCD-93E2-E3B085C9AB24}">
+                <p16:designElem xmlns:p16="http://schemas.microsoft.com/office/powerpoint/2015/main" val="1"/>
+              </p:ext>
+            </p:extLst>
+          </p:nvPr>
+        </p:nvSpPr>
+        <p:spPr>
+          <a:xfrm>
+            <a:off x="633061" y="554152"/>
+            <a:ext cx="171515" cy="171515"/>
+          </a:xfrm>
+          <a:custGeom>
+            <a:avLst/>
+            <a:gdLst>
+              <a:gd name="connsiteX0" fmla="*/ 159874 w 171515"/>
+              <a:gd name="connsiteY0" fmla="*/ 74116 h 171515"/>
+              <a:gd name="connsiteX1" fmla="*/ 97399 w 171515"/>
+              <a:gd name="connsiteY1" fmla="*/ 74116 h 171515"/>
+              <a:gd name="connsiteX2" fmla="*/ 97399 w 171515"/>
+              <a:gd name="connsiteY2" fmla="*/ 11641 h 171515"/>
+              <a:gd name="connsiteX3" fmla="*/ 85758 w 171515"/>
+              <a:gd name="connsiteY3" fmla="*/ 0 h 171515"/>
+              <a:gd name="connsiteX4" fmla="*/ 74116 w 171515"/>
+              <a:gd name="connsiteY4" fmla="*/ 11641 h 171515"/>
+              <a:gd name="connsiteX5" fmla="*/ 74116 w 171515"/>
+              <a:gd name="connsiteY5" fmla="*/ 74116 h 171515"/>
+              <a:gd name="connsiteX6" fmla="*/ 11641 w 171515"/>
+              <a:gd name="connsiteY6" fmla="*/ 74116 h 171515"/>
+              <a:gd name="connsiteX7" fmla="*/ 0 w 171515"/>
+              <a:gd name="connsiteY7" fmla="*/ 85758 h 171515"/>
+              <a:gd name="connsiteX8" fmla="*/ 11641 w 171515"/>
+              <a:gd name="connsiteY8" fmla="*/ 97399 h 171515"/>
+              <a:gd name="connsiteX9" fmla="*/ 74116 w 171515"/>
+              <a:gd name="connsiteY9" fmla="*/ 97399 h 171515"/>
+              <a:gd name="connsiteX10" fmla="*/ 74116 w 171515"/>
+              <a:gd name="connsiteY10" fmla="*/ 159874 h 171515"/>
+              <a:gd name="connsiteX11" fmla="*/ 85758 w 171515"/>
+              <a:gd name="connsiteY11" fmla="*/ 171515 h 171515"/>
+              <a:gd name="connsiteX12" fmla="*/ 97399 w 171515"/>
+              <a:gd name="connsiteY12" fmla="*/ 159874 h 171515"/>
+              <a:gd name="connsiteX13" fmla="*/ 97399 w 171515"/>
+              <a:gd name="connsiteY13" fmla="*/ 97399 h 171515"/>
+              <a:gd name="connsiteX14" fmla="*/ 159874 w 171515"/>
+              <a:gd name="connsiteY14" fmla="*/ 97399 h 171515"/>
+              <a:gd name="connsiteX15" fmla="*/ 171515 w 171515"/>
+              <a:gd name="connsiteY15" fmla="*/ 85758 h 171515"/>
+              <a:gd name="connsiteX16" fmla="*/ 159874 w 171515"/>
+              <a:gd name="connsiteY16" fmla="*/ 74116 h 171515"/>
+            </a:gdLst>
+            <a:ahLst/>
+            <a:cxnLst>
+              <a:cxn ang="0">
+                <a:pos x="connsiteX0" y="connsiteY0"/>
+              </a:cxn>
+              <a:cxn ang="0">
+                <a:pos x="connsiteX1" y="connsiteY1"/>
+              </a:cxn>
+              <a:cxn ang="0">
+                <a:pos x="connsiteX2" y="connsiteY2"/>
+              </a:cxn>
+              <a:cxn ang="0">
+                <a:pos x="connsiteX3" y="connsiteY3"/>
+              </a:cxn>
+              <a:cxn ang="0">
+                <a:pos x="connsiteX4" y="connsiteY4"/>
+              </a:cxn>
+              <a:cxn ang="0">
+                <a:pos x="connsiteX5" y="connsiteY5"/>
+              </a:cxn>
+              <a:cxn ang="0">
+                <a:pos x="connsiteX6" y="connsiteY6"/>
+              </a:cxn>
+              <a:cxn ang="0">
+                <a:pos x="connsiteX7" y="connsiteY7"/>
+              </a:cxn>
+              <a:cxn ang="0">
+                <a:pos x="connsiteX8" y="connsiteY8"/>
+              </a:cxn>
+              <a:cxn ang="0">
+                <a:pos x="connsiteX9" y="connsiteY9"/>
+              </a:cxn>
+              <a:cxn ang="0">
+                <a:pos x="connsiteX10" y="connsiteY10"/>
+              </a:cxn>
+              <a:cxn ang="0">
+                <a:pos x="connsiteX11" y="connsiteY11"/>
+              </a:cxn>
+              <a:cxn ang="0">
+                <a:pos x="connsiteX12" y="connsiteY12"/>
+              </a:cxn>
+              <a:cxn ang="0">
+                <a:pos x="connsiteX13" y="connsiteY13"/>
+              </a:cxn>
+              <a:cxn ang="0">
+                <a:pos x="connsiteX14" y="connsiteY14"/>
+              </a:cxn>
+              <a:cxn ang="0">
+                <a:pos x="connsiteX15" y="connsiteY15"/>
+              </a:cxn>
+              <a:cxn ang="0">
+                <a:pos x="connsiteX16" y="connsiteY16"/>
+              </a:cxn>
+            </a:cxnLst>
+            <a:rect l="l" t="t" r="r" b="b"/>
+            <a:pathLst>
+              <a:path w="171515" h="171515">
+                <a:moveTo>
+                  <a:pt x="159874" y="74116"/>
+                </a:moveTo>
+                <a:lnTo>
+                  <a:pt x="97399" y="74116"/>
+                </a:lnTo>
+                <a:lnTo>
+                  <a:pt x="97399" y="11641"/>
+                </a:lnTo>
+                <a:cubicBezTo>
+                  <a:pt x="97399" y="5212"/>
+                  <a:pt x="92187" y="0"/>
+                  <a:pt x="85758" y="0"/>
+                </a:cubicBezTo>
+                <a:cubicBezTo>
+                  <a:pt x="79328" y="0"/>
+                  <a:pt x="74116" y="5212"/>
+                  <a:pt x="74116" y="11641"/>
+                </a:cubicBezTo>
+                <a:lnTo>
+                  <a:pt x="74116" y="74116"/>
+                </a:lnTo>
+                <a:lnTo>
+                  <a:pt x="11641" y="74116"/>
+                </a:lnTo>
+                <a:cubicBezTo>
+                  <a:pt x="5212" y="74116"/>
+                  <a:pt x="0" y="79328"/>
+                  <a:pt x="0" y="85758"/>
+                </a:cubicBezTo>
+                <a:cubicBezTo>
+                  <a:pt x="0" y="92187"/>
+                  <a:pt x="5212" y="97399"/>
+                  <a:pt x="11641" y="97399"/>
+                </a:cubicBezTo>
+                <a:lnTo>
+                  <a:pt x="74116" y="97399"/>
+                </a:lnTo>
+                <a:lnTo>
+                  <a:pt x="74116" y="159874"/>
+                </a:lnTo>
+                <a:cubicBezTo>
+                  <a:pt x="74116" y="166303"/>
+                  <a:pt x="79328" y="171515"/>
+                  <a:pt x="85758" y="171515"/>
+                </a:cubicBezTo>
+                <a:cubicBezTo>
+                  <a:pt x="92187" y="171515"/>
+                  <a:pt x="97399" y="166303"/>
+                  <a:pt x="97399" y="159874"/>
+                </a:cubicBezTo>
+                <a:lnTo>
+                  <a:pt x="97399" y="97399"/>
+                </a:lnTo>
+                <a:lnTo>
+                  <a:pt x="159874" y="97399"/>
+                </a:lnTo>
+                <a:cubicBezTo>
+                  <a:pt x="166303" y="97399"/>
+                  <a:pt x="171515" y="92187"/>
+                  <a:pt x="171515" y="85758"/>
+                </a:cubicBezTo>
+                <a:cubicBezTo>
+                  <a:pt x="171515" y="79328"/>
+                  <a:pt x="166303" y="74116"/>
+                  <a:pt x="159874" y="74116"/>
+                </a:cubicBezTo>
+                <a:close/>
+              </a:path>
+            </a:pathLst>
+          </a:custGeom>
+          <a:solidFill>
+            <a:schemeClr val="bg1"/>
+          </a:solidFill>
+          <a:ln w="776" cap="flat">
+            <a:noFill/>
+            <a:prstDash val="solid"/>
+            <a:miter/>
+          </a:ln>
+        </p:spPr>
+        <p:txBody>
+          <a:bodyPr rtlCol="0" anchor="ctr"/>
+          <a:lstStyle/>
+          <a:p>
+            <a:endParaRPr lang="en-US"/>
+          </a:p>
+        </p:txBody>
+      </p:sp>
+      <p:sp>
+        <p:nvSpPr>
+          <p:cNvPr id="14" name="Graphic 10">
+            <a:extLst>
+              <a:ext uri="{FF2B5EF4-FFF2-40B4-BE49-F238E27FC236}">
+                <a16:creationId xmlns:a16="http://schemas.microsoft.com/office/drawing/2014/main" id="{E3020543-B24B-4EC4-8FFC-8DD88EEA91A8}"/>
+              </a:ext>
+              <a:ext uri="{C183D7F6-B498-43B3-948B-1728B52AA6E4}">
+                <adec:decorative xmlns:adec="http://schemas.microsoft.com/office/drawing/2017/decorative" val="1"/>
+              </a:ext>
+            </a:extLst>
+          </p:cNvPr>
+          <p:cNvSpPr>
+            <a:spLocks noGrp="1" noRot="1" noChangeAspect="1" noMove="1" noResize="1" noEditPoints="1" noAdjustHandles="1" noChangeArrowheads="1" noChangeShapeType="1" noTextEdit="1"/>
+          </p:cNvSpPr>
+          <p:nvPr>
+            <p:extLst>
+              <p:ext uri="{386F3935-93C4-4BCD-93E2-E3B085C9AB24}">
+                <p16:designElem xmlns:p16="http://schemas.microsoft.com/office/powerpoint/2015/main" val="1"/>
+              </p:ext>
+            </p:extLst>
+          </p:nvPr>
+        </p:nvSpPr>
+        <p:spPr>
+          <a:xfrm>
+            <a:off x="1075643" y="837005"/>
+            <a:ext cx="112426" cy="112426"/>
+          </a:xfrm>
+          <a:custGeom>
+            <a:avLst/>
+            <a:gdLst>
+              <a:gd name="connsiteX0" fmla="*/ 112426 w 112426"/>
+              <a:gd name="connsiteY0" fmla="*/ 56213 h 112426"/>
+              <a:gd name="connsiteX1" fmla="*/ 56213 w 112426"/>
+              <a:gd name="connsiteY1" fmla="*/ 112426 h 112426"/>
+              <a:gd name="connsiteX2" fmla="*/ 0 w 112426"/>
+              <a:gd name="connsiteY2" fmla="*/ 56213 h 112426"/>
+              <a:gd name="connsiteX3" fmla="*/ 56213 w 112426"/>
+              <a:gd name="connsiteY3" fmla="*/ 0 h 112426"/>
+              <a:gd name="connsiteX4" fmla="*/ 112426 w 112426"/>
+              <a:gd name="connsiteY4" fmla="*/ 56213 h 112426"/>
+            </a:gdLst>
+            <a:ahLst/>
+            <a:cxnLst>
+              <a:cxn ang="0">
+                <a:pos x="connsiteX0" y="connsiteY0"/>
+              </a:cxn>
+              <a:cxn ang="0">
+                <a:pos x="connsiteX1" y="connsiteY1"/>
+              </a:cxn>
+              <a:cxn ang="0">
+                <a:pos x="connsiteX2" y="connsiteY2"/>
+              </a:cxn>
+              <a:cxn ang="0">
+                <a:pos x="connsiteX3" y="connsiteY3"/>
+              </a:cxn>
+              <a:cxn ang="0">
+                <a:pos x="connsiteX4" y="connsiteY4"/>
+              </a:cxn>
+            </a:cxnLst>
+            <a:rect l="l" t="t" r="r" b="b"/>
+            <a:pathLst>
+              <a:path w="112426" h="112426">
+                <a:moveTo>
+                  <a:pt x="112426" y="56213"/>
+                </a:moveTo>
+                <a:cubicBezTo>
+                  <a:pt x="112426" y="87259"/>
+                  <a:pt x="87259" y="112426"/>
+                  <a:pt x="56213" y="112426"/>
+                </a:cubicBezTo>
+                <a:cubicBezTo>
+                  <a:pt x="25167" y="112426"/>
+                  <a:pt x="0" y="87259"/>
+                  <a:pt x="0" y="56213"/>
+                </a:cubicBezTo>
+                <a:cubicBezTo>
+                  <a:pt x="0" y="25167"/>
+                  <a:pt x="25167" y="0"/>
+                  <a:pt x="56213" y="0"/>
+                </a:cubicBezTo>
+                <a:cubicBezTo>
+                  <a:pt x="87259" y="0"/>
+                  <a:pt x="112426" y="25167"/>
+                  <a:pt x="112426" y="56213"/>
+                </a:cubicBezTo>
+                <a:close/>
+              </a:path>
+            </a:pathLst>
+          </a:custGeom>
+          <a:solidFill>
+            <a:schemeClr val="bg1"/>
+          </a:solidFill>
+          <a:ln w="516" cap="flat">
+            <a:noFill/>
+            <a:prstDash val="solid"/>
+            <a:miter/>
+          </a:ln>
+        </p:spPr>
+        <p:txBody>
+          <a:bodyPr rtlCol="0" anchor="ctr"/>
+          <a:lstStyle/>
+          <a:p>
+            <a:endParaRPr lang="en-US"/>
+          </a:p>
+        </p:txBody>
+      </p:sp>
+      <p:sp>
+        <p:nvSpPr>
+          <p:cNvPr id="16" name="Graphic 12">
+            <a:extLst>
+              <a:ext uri="{FF2B5EF4-FFF2-40B4-BE49-F238E27FC236}">
+                <a16:creationId xmlns:a16="http://schemas.microsoft.com/office/drawing/2014/main" id="{1453BF6C-B012-48B7-B4E8-6D7AC7C27D02}"/>
+              </a:ext>
+              <a:ext uri="{C183D7F6-B498-43B3-948B-1728B52AA6E4}">
+                <adec:decorative xmlns:adec="http://schemas.microsoft.com/office/drawing/2017/decorative" val="1"/>
+              </a:ext>
+            </a:extLst>
+          </p:cNvPr>
+          <p:cNvSpPr>
+            <a:spLocks noGrp="1" noRot="1" noChangeAspect="1" noMove="1" noResize="1" noEditPoints="1" noAdjustHandles="1" noChangeArrowheads="1" noChangeShapeType="1" noTextEdit="1"/>
+          </p:cNvSpPr>
+          <p:nvPr>
+            <p:extLst>
+              <p:ext uri="{386F3935-93C4-4BCD-93E2-E3B085C9AB24}">
+                <p16:designElem xmlns:p16="http://schemas.microsoft.com/office/powerpoint/2015/main" val="1"/>
+              </p:ext>
+            </p:extLst>
+          </p:nvPr>
+        </p:nvSpPr>
+        <p:spPr>
+          <a:xfrm>
+            <a:off x="613892" y="1472473"/>
+            <a:ext cx="157545" cy="157545"/>
+          </a:xfrm>
+          <a:custGeom>
+            <a:avLst/>
+            <a:gdLst>
+              <a:gd name="connsiteX0" fmla="*/ 78773 w 157545"/>
+              <a:gd name="connsiteY0" fmla="*/ 23283 h 157545"/>
+              <a:gd name="connsiteX1" fmla="*/ 134262 w 157545"/>
+              <a:gd name="connsiteY1" fmla="*/ 78773 h 157545"/>
+              <a:gd name="connsiteX2" fmla="*/ 78773 w 157545"/>
+              <a:gd name="connsiteY2" fmla="*/ 134262 h 157545"/>
+              <a:gd name="connsiteX3" fmla="*/ 23283 w 157545"/>
+              <a:gd name="connsiteY3" fmla="*/ 78773 h 157545"/>
+              <a:gd name="connsiteX4" fmla="*/ 78773 w 157545"/>
+              <a:gd name="connsiteY4" fmla="*/ 23283 h 157545"/>
+              <a:gd name="connsiteX5" fmla="*/ 78773 w 157545"/>
+              <a:gd name="connsiteY5" fmla="*/ 0 h 157545"/>
+              <a:gd name="connsiteX6" fmla="*/ 0 w 157545"/>
+              <a:gd name="connsiteY6" fmla="*/ 78773 h 157545"/>
+              <a:gd name="connsiteX7" fmla="*/ 78773 w 157545"/>
+              <a:gd name="connsiteY7" fmla="*/ 157545 h 157545"/>
+              <a:gd name="connsiteX8" fmla="*/ 157545 w 157545"/>
+              <a:gd name="connsiteY8" fmla="*/ 78773 h 157545"/>
+              <a:gd name="connsiteX9" fmla="*/ 78773 w 157545"/>
+              <a:gd name="connsiteY9" fmla="*/ 0 h 157545"/>
+            </a:gdLst>
+            <a:ahLst/>
+            <a:cxnLst>
+              <a:cxn ang="0">
+                <a:pos x="connsiteX0" y="connsiteY0"/>
+              </a:cxn>
+              <a:cxn ang="0">
+                <a:pos x="connsiteX1" y="connsiteY1"/>
+              </a:cxn>
+              <a:cxn ang="0">
+                <a:pos x="connsiteX2" y="connsiteY2"/>
+              </a:cxn>
+              <a:cxn ang="0">
+                <a:pos x="connsiteX3" y="connsiteY3"/>
+              </a:cxn>
+              <a:cxn ang="0">
+                <a:pos x="connsiteX4" y="connsiteY4"/>
+              </a:cxn>
+              <a:cxn ang="0">
+                <a:pos x="connsiteX5" y="connsiteY5"/>
+              </a:cxn>
+              <a:cxn ang="0">
+                <a:pos x="connsiteX6" y="connsiteY6"/>
+              </a:cxn>
+              <a:cxn ang="0">
+                <a:pos x="connsiteX7" y="connsiteY7"/>
+              </a:cxn>
+              <a:cxn ang="0">
+                <a:pos x="connsiteX8" y="connsiteY8"/>
+              </a:cxn>
+              <a:cxn ang="0">
+                <a:pos x="connsiteX9" y="connsiteY9"/>
+              </a:cxn>
+            </a:cxnLst>
+            <a:rect l="l" t="t" r="r" b="b"/>
+            <a:pathLst>
+              <a:path w="157545" h="157545">
+                <a:moveTo>
+                  <a:pt x="78773" y="23283"/>
+                </a:moveTo>
+                <a:cubicBezTo>
+                  <a:pt x="109419" y="23283"/>
+                  <a:pt x="134262" y="48126"/>
+                  <a:pt x="134262" y="78773"/>
+                </a:cubicBezTo>
+                <a:cubicBezTo>
+                  <a:pt x="134262" y="109419"/>
+                  <a:pt x="109419" y="134262"/>
+                  <a:pt x="78773" y="134262"/>
+                </a:cubicBezTo>
+                <a:cubicBezTo>
+                  <a:pt x="48126" y="134262"/>
+                  <a:pt x="23283" y="109419"/>
+                  <a:pt x="23283" y="78773"/>
+                </a:cubicBezTo>
+                <a:cubicBezTo>
+                  <a:pt x="23312" y="48139"/>
+                  <a:pt x="48139" y="23312"/>
+                  <a:pt x="78773" y="23283"/>
+                </a:cubicBezTo>
+                <a:moveTo>
+                  <a:pt x="78773" y="0"/>
+                </a:moveTo>
+                <a:cubicBezTo>
+                  <a:pt x="35268" y="0"/>
+                  <a:pt x="0" y="35268"/>
+                  <a:pt x="0" y="78773"/>
+                </a:cubicBezTo>
+                <a:cubicBezTo>
+                  <a:pt x="0" y="122277"/>
+                  <a:pt x="35268" y="157545"/>
+                  <a:pt x="78773" y="157545"/>
+                </a:cubicBezTo>
+                <a:cubicBezTo>
+                  <a:pt x="122277" y="157545"/>
+                  <a:pt x="157545" y="122277"/>
+                  <a:pt x="157545" y="78773"/>
+                </a:cubicBezTo>
+                <a:cubicBezTo>
+                  <a:pt x="157545" y="35268"/>
+                  <a:pt x="122277" y="0"/>
+                  <a:pt x="78773" y="0"/>
+                </a:cubicBezTo>
+                <a:close/>
+              </a:path>
+            </a:pathLst>
+          </a:custGeom>
+          <a:solidFill>
+            <a:schemeClr val="bg1"/>
+          </a:solidFill>
+          <a:ln w="751" cap="flat">
+            <a:noFill/>
+            <a:prstDash val="solid"/>
+            <a:miter/>
+          </a:ln>
+        </p:spPr>
+        <p:txBody>
+          <a:bodyPr rtlCol="0" anchor="ctr"/>
+          <a:lstStyle/>
+          <a:p>
+            <a:endParaRPr lang="en-US"/>
+          </a:p>
+        </p:txBody>
+      </p:sp>
+      <p:cxnSp>
+        <p:nvCxnSpPr>
+          <p:cNvPr id="18" name="Straight Connector 17">
+            <a:extLst>
+              <a:ext uri="{FF2B5EF4-FFF2-40B4-BE49-F238E27FC236}">
+                <a16:creationId xmlns:a16="http://schemas.microsoft.com/office/drawing/2014/main" id="{C49DA8F6-BCC1-4447-B54C-57856834B94B}"/>
+              </a:ext>
+              <a:ext uri="{C183D7F6-B498-43B3-948B-1728B52AA6E4}">
+                <adec:decorative xmlns:adec="http://schemas.microsoft.com/office/drawing/2017/decorative" val="1"/>
+              </a:ext>
+            </a:extLst>
+          </p:cNvPr>
+          <p:cNvCxnSpPr>
+            <a:cxnSpLocks noGrp="1" noRot="1" noChangeAspect="1" noMove="1" noResize="1" noEditPoints="1" noAdjustHandles="1" noChangeArrowheads="1" noChangeShapeType="1"/>
+          </p:cNvCxnSpPr>
+          <p:nvPr>
+            <p:extLst>
+              <p:ext uri="{386F3935-93C4-4BCD-93E2-E3B085C9AB24}">
+                <p16:designElem xmlns:p16="http://schemas.microsoft.com/office/powerpoint/2015/main" val="1"/>
+              </p:ext>
+            </p:extLst>
+          </p:nvPr>
+        </p:nvCxnSpPr>
+        <p:spPr>
+          <a:xfrm>
+            <a:off x="11586162" y="3610394"/>
+            <a:ext cx="0" cy="3238728"/>
+          </a:xfrm>
+          <a:prstGeom prst="line">
+            <a:avLst/>
+          </a:prstGeom>
+          <a:ln w="25400" cap="sq">
+            <a:gradFill flip="none" rotWithShape="1">
+              <a:gsLst>
+                <a:gs pos="0">
+                  <a:schemeClr val="accent2"/>
+                </a:gs>
+                <a:gs pos="100000">
+                  <a:schemeClr val="accent4"/>
+                </a:gs>
+              </a:gsLst>
+              <a:lin ang="5400000" scaled="1"/>
+              <a:tileRect/>
+            </a:gradFill>
+            <a:bevel/>
+          </a:ln>
+        </p:spPr>
+        <p:style>
+          <a:lnRef idx="1">
+            <a:schemeClr val="accent1"/>
+          </a:lnRef>
+          <a:fillRef idx="0">
+            <a:schemeClr val="accent1"/>
+          </a:fillRef>
+          <a:effectRef idx="0">
+            <a:schemeClr val="accent1"/>
+          </a:effectRef>
+          <a:fontRef idx="minor">
+            <a:schemeClr val="tx1"/>
+          </a:fontRef>
+        </p:style>
+      </p:cxnSp>
+      <p:sp>
+        <p:nvSpPr>
+          <p:cNvPr id="5" name="Título 1">
+            <a:extLst>
+              <a:ext uri="{FF2B5EF4-FFF2-40B4-BE49-F238E27FC236}">
+                <a16:creationId xmlns:a16="http://schemas.microsoft.com/office/drawing/2014/main" id="{20EA060E-D167-6ACF-6E3A-5283A4C67D85}"/>
+              </a:ext>
+            </a:extLst>
+          </p:cNvPr>
+          <p:cNvSpPr txBox="1">
+            <a:spLocks/>
+          </p:cNvSpPr>
+          <p:nvPr/>
+        </p:nvSpPr>
+        <p:spPr>
+          <a:xfrm>
+            <a:off x="613892" y="2053244"/>
+            <a:ext cx="5022410" cy="1356924"/>
+          </a:xfrm>
+          <a:prstGeom prst="rect">
+            <a:avLst/>
+          </a:prstGeom>
+        </p:spPr>
+        <p:txBody>
+          <a:bodyPr vert="horz" lIns="91440" tIns="45720" rIns="91440" bIns="45720" rtlCol="0" anchor="ctr">
+            <a:noAutofit/>
+          </a:bodyPr>
+          <a:lstStyle>
+            <a:lvl1pPr algn="l" defTabSz="914400" rtl="0" eaLnBrk="1" latinLnBrk="0" hangingPunct="1">
+              <a:lnSpc>
+                <a:spcPct val="90000"/>
+              </a:lnSpc>
+              <a:spcBef>
+                <a:spcPct val="0"/>
+              </a:spcBef>
+              <a:buNone/>
+              <a:defRPr sz="4800" kern="1200">
+                <a:solidFill>
+                  <a:schemeClr val="tx1"/>
+                </a:solidFill>
+                <a:latin typeface="+mj-lt"/>
+                <a:ea typeface="+mj-ea"/>
+                <a:cs typeface="+mj-cs"/>
+              </a:defRPr>
+            </a:lvl1pPr>
+          </a:lstStyle>
+          <a:p>
+            <a:r>
+              <a:rPr lang="es-MX" sz="2800" dirty="0">
+                <a:solidFill>
+                  <a:schemeClr val="bg1"/>
+                </a:solidFill>
+                <a:latin typeface="Microsoft YaHei" panose="020B0503020204020204" pitchFamily="34" charset="-122"/>
+                <a:ea typeface="Microsoft YaHei" panose="020B0503020204020204" pitchFamily="34" charset="-122"/>
+              </a:rPr>
+              <a:t>Notable patterns or trends in the product agrupation ID with high sales volume.</a:t>
+            </a:r>
+          </a:p>
+        </p:txBody>
+      </p:sp>
+      <p:sp>
+        <p:nvSpPr>
+          <p:cNvPr id="11" name="Título 1">
+            <a:extLst>
+              <a:ext uri="{FF2B5EF4-FFF2-40B4-BE49-F238E27FC236}">
+                <a16:creationId xmlns:a16="http://schemas.microsoft.com/office/drawing/2014/main" id="{FF2B3F6A-6EBC-17B6-BA7E-786C188FA4D5}"/>
+              </a:ext>
+            </a:extLst>
+          </p:cNvPr>
+          <p:cNvSpPr txBox="1">
+            <a:spLocks/>
+          </p:cNvSpPr>
+          <p:nvPr/>
+        </p:nvSpPr>
+        <p:spPr>
+          <a:xfrm>
+            <a:off x="746009" y="3173648"/>
+            <a:ext cx="4287891" cy="1356924"/>
+          </a:xfrm>
+          <a:prstGeom prst="rect">
+            <a:avLst/>
+          </a:prstGeom>
+        </p:spPr>
+        <p:txBody>
+          <a:bodyPr vert="horz" lIns="91440" tIns="45720" rIns="91440" bIns="45720" rtlCol="0" anchor="ctr">
+            <a:normAutofit/>
+          </a:bodyPr>
+          <a:lstStyle>
+            <a:lvl1pPr algn="l" defTabSz="914400" rtl="0" eaLnBrk="1" latinLnBrk="0" hangingPunct="1">
+              <a:lnSpc>
+                <a:spcPct val="90000"/>
+              </a:lnSpc>
+              <a:spcBef>
+                <a:spcPct val="0"/>
+              </a:spcBef>
+              <a:buNone/>
+              <a:defRPr sz="4800" kern="1200">
+                <a:solidFill>
+                  <a:schemeClr val="tx1"/>
+                </a:solidFill>
+                <a:latin typeface="+mj-lt"/>
+                <a:ea typeface="+mj-ea"/>
+                <a:cs typeface="+mj-cs"/>
+              </a:defRPr>
+            </a:lvl1pPr>
+          </a:lstStyle>
+          <a:p>
+            <a:r>
+              <a:rPr lang="es-MX" sz="2800" dirty="0">
+                <a:solidFill>
+                  <a:schemeClr val="bg1">
+                    <a:lumMod val="95000"/>
+                  </a:schemeClr>
+                </a:solidFill>
+                <a:latin typeface="Microsoft YaHei" panose="020B0503020204020204" pitchFamily="34" charset="-122"/>
+                <a:ea typeface="Microsoft YaHei" panose="020B0503020204020204" pitchFamily="34" charset="-122"/>
+              </a:rPr>
+              <a:t>- - - - - - - - - - - - - - - -</a:t>
+            </a:r>
+            <a:endParaRPr lang="es-MX" sz="2800" b="0" dirty="0">
+              <a:solidFill>
+                <a:schemeClr val="bg1">
+                  <a:lumMod val="95000"/>
+                </a:schemeClr>
+              </a:solidFill>
+              <a:effectLst/>
+              <a:latin typeface="Microsoft YaHei" panose="020B0503020204020204" pitchFamily="34" charset="-122"/>
+              <a:ea typeface="Microsoft YaHei" panose="020B0503020204020204" pitchFamily="34" charset="-122"/>
+            </a:endParaRPr>
+          </a:p>
+        </p:txBody>
+      </p:sp>
+      <p:sp>
+        <p:nvSpPr>
+          <p:cNvPr id="13" name="Título 1">
+            <a:extLst>
+              <a:ext uri="{FF2B5EF4-FFF2-40B4-BE49-F238E27FC236}">
+                <a16:creationId xmlns:a16="http://schemas.microsoft.com/office/drawing/2014/main" id="{4D7D3F7C-8F7B-90CE-B683-56199F8AB002}"/>
+              </a:ext>
+            </a:extLst>
+          </p:cNvPr>
+          <p:cNvSpPr txBox="1">
+            <a:spLocks/>
+          </p:cNvSpPr>
+          <p:nvPr/>
+        </p:nvSpPr>
+        <p:spPr>
+          <a:xfrm>
+            <a:off x="671553" y="4125204"/>
+            <a:ext cx="4818610" cy="2308712"/>
+          </a:xfrm>
+          <a:prstGeom prst="rect">
+            <a:avLst/>
+          </a:prstGeom>
+        </p:spPr>
+        <p:txBody>
+          <a:bodyPr vert="horz" lIns="91440" tIns="45720" rIns="91440" bIns="45720" rtlCol="0" anchor="ctr">
+            <a:normAutofit/>
+          </a:bodyPr>
+          <a:lstStyle>
+            <a:lvl1pPr algn="l" defTabSz="914400" rtl="0" eaLnBrk="1" latinLnBrk="0" hangingPunct="1">
+              <a:lnSpc>
+                <a:spcPct val="90000"/>
+              </a:lnSpc>
+              <a:spcBef>
+                <a:spcPct val="0"/>
+              </a:spcBef>
+              <a:buNone/>
+              <a:defRPr sz="4800" kern="1200">
+                <a:solidFill>
+                  <a:schemeClr val="tx1"/>
+                </a:solidFill>
+                <a:latin typeface="+mj-lt"/>
+                <a:ea typeface="+mj-ea"/>
+                <a:cs typeface="+mj-cs"/>
+              </a:defRPr>
+            </a:lvl1pPr>
+          </a:lstStyle>
+          <a:p>
+            <a:r>
+              <a:rPr lang="es-MX" sz="2000" dirty="0">
+                <a:solidFill>
+                  <a:schemeClr val="bg1">
+                    <a:lumMod val="95000"/>
+                  </a:schemeClr>
+                </a:solidFill>
+                <a:latin typeface="Microsoft YaHei" panose="020B0503020204020204" pitchFamily="34" charset="-122"/>
+                <a:ea typeface="Microsoft YaHei" panose="020B0503020204020204" pitchFamily="34" charset="-122"/>
+              </a:rPr>
+              <a:t>For many of the most popular agrupation IDs, we can see sales </a:t>
+            </a:r>
+            <a:r>
+              <a:rPr lang="es-MX" sz="2000" b="1" dirty="0">
+                <a:solidFill>
+                  <a:schemeClr val="bg1">
+                    <a:lumMod val="95000"/>
+                  </a:schemeClr>
+                </a:solidFill>
+                <a:latin typeface="Microsoft YaHei" panose="020B0503020204020204" pitchFamily="34" charset="-122"/>
+                <a:ea typeface="Microsoft YaHei" panose="020B0503020204020204" pitchFamily="34" charset="-122"/>
+              </a:rPr>
+              <a:t>spikes</a:t>
+            </a:r>
+            <a:r>
+              <a:rPr lang="es-MX" sz="2000" dirty="0">
+                <a:solidFill>
+                  <a:schemeClr val="bg1">
+                    <a:lumMod val="95000"/>
+                  </a:schemeClr>
+                </a:solidFill>
+                <a:latin typeface="Microsoft YaHei" panose="020B0503020204020204" pitchFamily="34" charset="-122"/>
+                <a:ea typeface="Microsoft YaHei" panose="020B0503020204020204" pitchFamily="34" charset="-122"/>
+              </a:rPr>
+              <a:t> in the </a:t>
+            </a:r>
+            <a:r>
+              <a:rPr lang="es-MX" sz="2000" b="1" dirty="0">
+                <a:solidFill>
+                  <a:schemeClr val="bg1">
+                    <a:lumMod val="95000"/>
+                  </a:schemeClr>
+                </a:solidFill>
+                <a:latin typeface="Microsoft YaHei" panose="020B0503020204020204" pitchFamily="34" charset="-122"/>
+                <a:ea typeface="Microsoft YaHei" panose="020B0503020204020204" pitchFamily="34" charset="-122"/>
+              </a:rPr>
+              <a:t>16th of January </a:t>
+            </a:r>
+            <a:br>
+              <a:rPr lang="es-MX" sz="2000" dirty="0">
+                <a:solidFill>
+                  <a:schemeClr val="bg1">
+                    <a:lumMod val="95000"/>
+                  </a:schemeClr>
+                </a:solidFill>
+                <a:latin typeface="Microsoft YaHei" panose="020B0503020204020204" pitchFamily="34" charset="-122"/>
+                <a:ea typeface="Microsoft YaHei" panose="020B0503020204020204" pitchFamily="34" charset="-122"/>
+              </a:rPr>
+            </a:br>
+            <a:r>
+              <a:rPr lang="es-MX" sz="2000" dirty="0">
+                <a:solidFill>
+                  <a:schemeClr val="bg1">
+                    <a:lumMod val="95000"/>
+                  </a:schemeClr>
+                </a:solidFill>
+                <a:latin typeface="Microsoft YaHei" panose="020B0503020204020204" pitchFamily="34" charset="-122"/>
+                <a:ea typeface="Microsoft YaHei" panose="020B0503020204020204" pitchFamily="34" charset="-122"/>
+              </a:rPr>
+              <a:t>(5 out of the top 7).</a:t>
+            </a:r>
+          </a:p>
+          <a:p>
+            <a:endParaRPr lang="es-MX" sz="2000" dirty="0">
+              <a:solidFill>
+                <a:schemeClr val="bg1">
+                  <a:lumMod val="95000"/>
+                </a:schemeClr>
+              </a:solidFill>
+              <a:latin typeface="Microsoft YaHei" panose="020B0503020204020204" pitchFamily="34" charset="-122"/>
+              <a:ea typeface="Microsoft YaHei" panose="020B0503020204020204" pitchFamily="34" charset="-122"/>
+            </a:endParaRPr>
+          </a:p>
+          <a:p>
+            <a:r>
+              <a:rPr lang="es-MX" sz="2000" dirty="0">
+                <a:solidFill>
+                  <a:schemeClr val="bg1">
+                    <a:lumMod val="95000"/>
+                  </a:schemeClr>
+                </a:solidFill>
+                <a:latin typeface="Microsoft YaHei" panose="020B0503020204020204" pitchFamily="34" charset="-122"/>
+                <a:ea typeface="Microsoft YaHei" panose="020B0503020204020204" pitchFamily="34" charset="-122"/>
+              </a:rPr>
+              <a:t>3 out of the top 5 agrupation IDs consist of a single product ID.</a:t>
+            </a:r>
+          </a:p>
+        </p:txBody>
+      </p:sp>
+      <p:pic>
+        <p:nvPicPr>
+          <p:cNvPr id="4" name="Imagen 3">
+            <a:extLst>
+              <a:ext uri="{FF2B5EF4-FFF2-40B4-BE49-F238E27FC236}">
+                <a16:creationId xmlns:a16="http://schemas.microsoft.com/office/drawing/2014/main" id="{C94633FC-C291-1968-6535-0A457C12C2DC}"/>
+              </a:ext>
+            </a:extLst>
+          </p:cNvPr>
+          <p:cNvPicPr>
+            <a:picLocks noChangeAspect="1"/>
+          </p:cNvPicPr>
+          <p:nvPr/>
+        </p:nvPicPr>
+        <p:blipFill>
+          <a:blip r:embed="rId2"/>
+          <a:stretch>
+            <a:fillRect/>
+          </a:stretch>
+        </p:blipFill>
+        <p:spPr>
+          <a:xfrm>
+            <a:off x="5952248" y="0"/>
+            <a:ext cx="5884905" cy="6858000"/>
+          </a:xfrm>
+          <a:prstGeom prst="rect">
+            <a:avLst/>
+          </a:prstGeom>
+        </p:spPr>
+      </p:pic>
+    </p:spTree>
+    <p:extLst>
+      <p:ext uri="{BB962C8B-B14F-4D97-AF65-F5344CB8AC3E}">
+        <p14:creationId xmlns:p14="http://schemas.microsoft.com/office/powerpoint/2010/main" val="2282158953"/>
+      </p:ext>
+    </p:extLst>
+  </p:cSld>
+  <p:clrMapOvr>
+    <a:masterClrMapping/>
+  </p:clrMapOvr>
+  <p:transition spd="slow">
+    <p:wipe/>
+  </p:transition>
+  <p:timing>
+    <p:tnLst>
+      <p:par>
+        <p:cTn id="1" dur="indefinite" restart="never" nodeType="tmRoot">
+          <p:childTnLst>
+            <p:seq concurrent="1" nextAc="seek">
+              <p:cTn id="2" dur="indefinite" nodeType="mainSeq">
+                <p:childTnLst>
+                  <p:par>
+                    <p:cTn id="3" fill="hold">
+                      <p:stCondLst>
+                        <p:cond delay="indefinite"/>
+                      </p:stCondLst>
+                      <p:childTnLst>
+                        <p:par>
+                          <p:cTn id="4" fill="hold">
+                            <p:stCondLst>
+                              <p:cond delay="0"/>
+                            </p:stCondLst>
+                            <p:childTnLst>
+                              <p:par>
+                                <p:cTn id="5" presetID="12" presetClass="entr" presetSubtype="4" fill="hold" grpId="0" nodeType="clickEffect">
+                                  <p:stCondLst>
+                                    <p:cond delay="0"/>
+                                  </p:stCondLst>
+                                  <p:childTnLst>
+                                    <p:set>
+                                      <p:cBhvr>
+                                        <p:cTn id="6" dur="1" fill="hold">
+                                          <p:stCondLst>
+                                            <p:cond delay="0"/>
+                                          </p:stCondLst>
+                                        </p:cTn>
+                                        <p:tgtEl>
+                                          <p:spTgt spid="5"/>
+                                        </p:tgtEl>
+                                        <p:attrNameLst>
+                                          <p:attrName>style.visibility</p:attrName>
+                                        </p:attrNameLst>
+                                      </p:cBhvr>
+                                      <p:to>
+                                        <p:strVal val="visible"/>
+                                      </p:to>
+                                    </p:set>
+                                    <p:anim calcmode="lin" valueType="num">
+                                      <p:cBhvr additive="base">
+                                        <p:cTn id="7" dur="500"/>
+                                        <p:tgtEl>
+                                          <p:spTgt spid="5"/>
+                                        </p:tgtEl>
+                                        <p:attrNameLst>
+                                          <p:attrName>ppt_y</p:attrName>
+                                        </p:attrNameLst>
+                                      </p:cBhvr>
+                                      <p:tavLst>
+                                        <p:tav tm="0">
+                                          <p:val>
+                                            <p:strVal val="#ppt_y+#ppt_h*1.125000"/>
+                                          </p:val>
+                                        </p:tav>
+                                        <p:tav tm="100000">
+                                          <p:val>
+                                            <p:strVal val="#ppt_y"/>
+                                          </p:val>
+                                        </p:tav>
+                                      </p:tavLst>
+                                    </p:anim>
+                                    <p:animEffect transition="in" filter="wipe(up)">
+                                      <p:cBhvr>
+                                        <p:cTn id="8" dur="500"/>
+                                        <p:tgtEl>
+                                          <p:spTgt spid="5"/>
+                                        </p:tgtEl>
+                                      </p:cBhvr>
+                                    </p:animEffect>
+                                  </p:childTnLst>
+                                </p:cTn>
+                              </p:par>
+                            </p:childTnLst>
+                          </p:cTn>
+                        </p:par>
+                      </p:childTnLst>
+                    </p:cTn>
+                  </p:par>
+                  <p:par>
+                    <p:cTn id="9" fill="hold">
+                      <p:stCondLst>
+                        <p:cond delay="indefinite"/>
+                      </p:stCondLst>
+                      <p:childTnLst>
+                        <p:par>
+                          <p:cTn id="10" fill="hold">
+                            <p:stCondLst>
+                              <p:cond delay="0"/>
+                            </p:stCondLst>
+                            <p:childTnLst>
+                              <p:par>
+                                <p:cTn id="11" presetID="5" presetClass="entr" presetSubtype="10" fill="hold" nodeType="clickEffect">
+                                  <p:stCondLst>
+                                    <p:cond delay="0"/>
+                                  </p:stCondLst>
+                                  <p:childTnLst>
+                                    <p:set>
+                                      <p:cBhvr>
+                                        <p:cTn id="12" dur="1" fill="hold">
+                                          <p:stCondLst>
+                                            <p:cond delay="0"/>
+                                          </p:stCondLst>
+                                        </p:cTn>
+                                        <p:tgtEl>
+                                          <p:spTgt spid="4"/>
+                                        </p:tgtEl>
+                                        <p:attrNameLst>
+                                          <p:attrName>style.visibility</p:attrName>
+                                        </p:attrNameLst>
+                                      </p:cBhvr>
+                                      <p:to>
+                                        <p:strVal val="visible"/>
+                                      </p:to>
+                                    </p:set>
+                                    <p:animEffect transition="in" filter="checkerboard(across)">
+                                      <p:cBhvr>
+                                        <p:cTn id="13" dur="500"/>
+                                        <p:tgtEl>
+                                          <p:spTgt spid="4"/>
+                                        </p:tgtEl>
+                                      </p:cBhvr>
+                                    </p:animEffect>
+                                  </p:childTnLst>
+                                </p:cTn>
+                              </p:par>
+                            </p:childTnLst>
+                          </p:cTn>
+                        </p:par>
+                      </p:childTnLst>
+                    </p:cTn>
+                  </p:par>
+                  <p:par>
+                    <p:cTn id="14" fill="hold">
+                      <p:stCondLst>
+                        <p:cond delay="indefinite"/>
+                      </p:stCondLst>
+                      <p:childTnLst>
+                        <p:par>
+                          <p:cTn id="15" fill="hold">
+                            <p:stCondLst>
+                              <p:cond delay="0"/>
+                            </p:stCondLst>
+                            <p:childTnLst>
+                              <p:par>
+                                <p:cTn id="16" presetID="9" presetClass="entr" presetSubtype="0" fill="hold" grpId="0" nodeType="clickEffect">
+                                  <p:stCondLst>
+                                    <p:cond delay="0"/>
+                                  </p:stCondLst>
+                                  <p:childTnLst>
+                                    <p:set>
+                                      <p:cBhvr>
+                                        <p:cTn id="17" dur="1" fill="hold">
+                                          <p:stCondLst>
+                                            <p:cond delay="0"/>
+                                          </p:stCondLst>
+                                        </p:cTn>
+                                        <p:tgtEl>
+                                          <p:spTgt spid="13"/>
+                                        </p:tgtEl>
+                                        <p:attrNameLst>
+                                          <p:attrName>style.visibility</p:attrName>
+                                        </p:attrNameLst>
+                                      </p:cBhvr>
+                                      <p:to>
+                                        <p:strVal val="visible"/>
+                                      </p:to>
+                                    </p:set>
+                                    <p:animEffect transition="in" filter="dissolve">
+                                      <p:cBhvr>
+                                        <p:cTn id="18" dur="500"/>
+                                        <p:tgtEl>
+                                          <p:spTgt spid="13"/>
+                                        </p:tgtEl>
+                                      </p:cBhvr>
+                                    </p:animEffect>
+                                  </p:childTnLst>
+                                </p:cTn>
+                              </p:par>
+                            </p:childTnLst>
+                          </p:cTn>
+                        </p:par>
+                      </p:childTnLst>
+                    </p:cTn>
+                  </p:par>
+                </p:childTnLst>
+              </p:cTn>
+              <p:prevCondLst>
+                <p:cond evt="onPrev" delay="0">
+                  <p:tgtEl>
+                    <p:sldTgt/>
+                  </p:tgtEl>
+                </p:cond>
+              </p:prevCondLst>
+              <p:nextCondLst>
+                <p:cond evt="onNext" delay="0">
+                  <p:tgtEl>
+                    <p:sldTgt/>
+                  </p:tgtEl>
+                </p:cond>
+              </p:nextCondLst>
+            </p:seq>
+          </p:childTnLst>
+        </p:cTn>
+      </p:par>
+    </p:tnLst>
+    <p:bldLst>
+      <p:bldP spid="5" grpId="0"/>
+      <p:bldP spid="13" grpId="0"/>
+    </p:bldLst>
+  </p:timing>
+</p:sld>
+</file>
+
+<file path=ppt/slides/slide9.xml><?xml version="1.0" encoding="utf-8"?>
+<p:sld xmlns:a="http://schemas.openxmlformats.org/drawingml/2006/main" xmlns:r="http://schemas.openxmlformats.org/officeDocument/2006/relationships" xmlns:p="http://schemas.openxmlformats.org/presentationml/2006/main">
+  <p:cSld>
+    <p:bg>
+      <p:bgPr>
+        <a:solidFill>
+          <a:schemeClr val="bg1"/>
+        </a:solidFill>
+        <a:effectLst/>
+      </p:bgPr>
+    </p:bg>
+    <p:spTree>
+      <p:nvGrpSpPr>
+        <p:cNvPr id="1" name=""/>
+        <p:cNvGrpSpPr/>
+        <p:nvPr/>
+      </p:nvGrpSpPr>
+      <p:grpSpPr>
+        <a:xfrm>
+          <a:off x="0" y="0"/>
+          <a:ext cx="0" cy="0"/>
+          <a:chOff x="0" y="0"/>
+          <a:chExt cx="0" cy="0"/>
+        </a:xfrm>
+      </p:grpSpPr>
+      <p:cxnSp>
+        <p:nvCxnSpPr>
+          <p:cNvPr id="8" name="Straight Connector 7">
+            <a:extLst>
+              <a:ext uri="{FF2B5EF4-FFF2-40B4-BE49-F238E27FC236}">
+                <a16:creationId xmlns:a16="http://schemas.microsoft.com/office/drawing/2014/main" id="{D1B787A8-0D67-4B7E-9B48-86BD906AB6B5}"/>
+              </a:ext>
+              <a:ext uri="{C183D7F6-B498-43B3-948B-1728B52AA6E4}">
+                <adec:decorative xmlns:adec="http://schemas.microsoft.com/office/drawing/2017/decorative" val="1"/>
+              </a:ext>
+            </a:extLst>
+          </p:cNvPr>
+          <p:cNvCxnSpPr>
+            <a:cxnSpLocks noGrp="1" noRot="1" noChangeAspect="1" noMove="1" noResize="1" noEditPoints="1" noAdjustHandles="1" noChangeArrowheads="1" noChangeShapeType="1"/>
+          </p:cNvCxnSpPr>
+          <p:nvPr>
+            <p:extLst>
+              <p:ext uri="{386F3935-93C4-4BCD-93E2-E3B085C9AB24}">
+                <p16:designElem xmlns:p16="http://schemas.microsoft.com/office/powerpoint/2015/main" val="1"/>
+              </p:ext>
+            </p:extLst>
+          </p:nvPr>
+        </p:nvCxnSpPr>
+        <p:spPr>
+          <a:xfrm>
+            <a:off x="715890" y="1114050"/>
+            <a:ext cx="0" cy="5735637"/>
+          </a:xfrm>
+          <a:prstGeom prst="line">
+            <a:avLst/>
+          </a:prstGeom>
+          <a:ln w="25400" cap="sq">
+            <a:gradFill flip="none" rotWithShape="1">
+              <a:gsLst>
+                <a:gs pos="0">
+                  <a:schemeClr val="accent2"/>
+                </a:gs>
+                <a:gs pos="100000">
+                  <a:schemeClr val="accent4"/>
+                </a:gs>
+              </a:gsLst>
+              <a:lin ang="16200000" scaled="1"/>
+              <a:tileRect/>
+            </a:gradFill>
+            <a:bevel/>
+          </a:ln>
+        </p:spPr>
+        <p:style>
+          <a:lnRef idx="1">
+            <a:schemeClr val="accent1"/>
+          </a:lnRef>
+          <a:fillRef idx="0">
+            <a:schemeClr val="accent1"/>
+          </a:fillRef>
+          <a:effectRef idx="0">
+            <a:schemeClr val="accent1"/>
+          </a:effectRef>
+          <a:fontRef idx="minor">
+            <a:schemeClr val="tx1"/>
+          </a:fontRef>
+        </p:style>
+      </p:cxnSp>
+      <p:sp>
+        <p:nvSpPr>
+          <p:cNvPr id="10" name="Rectangle 9">
+            <a:extLst>
+              <a:ext uri="{FF2B5EF4-FFF2-40B4-BE49-F238E27FC236}">
+                <a16:creationId xmlns:a16="http://schemas.microsoft.com/office/drawing/2014/main" id="{1A3C89F8-0D2F-47FF-B903-151248265F47}"/>
+              </a:ext>
+              <a:ext uri="{C183D7F6-B498-43B3-948B-1728B52AA6E4}">
+                <adec:decorative xmlns:adec="http://schemas.microsoft.com/office/drawing/2017/decorative" val="1"/>
+              </a:ext>
+            </a:extLst>
+          </p:cNvPr>
+          <p:cNvSpPr>
+            <a:spLocks noGrp="1" noRot="1" noChangeAspect="1" noMove="1" noResize="1" noEditPoints="1" noAdjustHandles="1" noChangeArrowheads="1" noChangeShapeType="1" noTextEdit="1"/>
+          </p:cNvSpPr>
+          <p:nvPr>
+            <p:extLst>
+              <p:ext uri="{386F3935-93C4-4BCD-93E2-E3B085C9AB24}">
+                <p16:designElem xmlns:p16="http://schemas.microsoft.com/office/powerpoint/2015/main" val="1"/>
+              </p:ext>
+            </p:extLst>
+          </p:nvPr>
+        </p:nvSpPr>
+        <p:spPr>
+          <a:xfrm>
+            <a:off x="0" y="0"/>
+            <a:ext cx="12192000" cy="6858000"/>
+          </a:xfrm>
+          <a:prstGeom prst="rect">
+            <a:avLst/>
+          </a:prstGeom>
+          <a:gradFill flip="none" rotWithShape="1">
+            <a:gsLst>
+              <a:gs pos="100000">
+                <a:schemeClr val="accent4"/>
+              </a:gs>
+              <a:gs pos="0">
+                <a:schemeClr val="accent2"/>
+              </a:gs>
+            </a:gsLst>
+            <a:lin ang="8100000" scaled="1"/>
+            <a:tileRect/>
+          </a:gradFill>
+          <a:ln>
+            <a:noFill/>
+          </a:ln>
+        </p:spPr>
+        <p:style>
+          <a:lnRef idx="2">
+            <a:schemeClr val="accent1">
+              <a:shade val="50000"/>
+            </a:schemeClr>
+          </a:lnRef>
+          <a:fillRef idx="1">
+            <a:schemeClr val="accent1"/>
+          </a:fillRef>
+          <a:effectRef idx="0">
+            <a:schemeClr val="accent1"/>
+          </a:effectRef>
+          <a:fontRef idx="minor">
+            <a:schemeClr val="lt1"/>
+          </a:fontRef>
+        </p:style>
+        <p:txBody>
+          <a:bodyPr rtlCol="0" anchor="ctr"/>
+          <a:lstStyle/>
+          <a:p>
+            <a:pPr algn="ctr"/>
+            <a:endParaRPr lang="en-US"/>
+          </a:p>
+        </p:txBody>
+      </p:sp>
+      <p:sp>
+        <p:nvSpPr>
+          <p:cNvPr id="12" name="Graphic 13">
+            <a:extLst>
+              <a:ext uri="{FF2B5EF4-FFF2-40B4-BE49-F238E27FC236}">
+                <a16:creationId xmlns:a16="http://schemas.microsoft.com/office/drawing/2014/main" id="{C5CB530E-515E-412C-9DF1-5F8FFBD6F383}"/>
+              </a:ext>
+              <a:ext uri="{C183D7F6-B498-43B3-948B-1728B52AA6E4}">
+                <adec:decorative xmlns:adec="http://schemas.microsoft.com/office/drawing/2017/decorative" val="1"/>
+              </a:ext>
+            </a:extLst>
+          </p:cNvPr>
+          <p:cNvSpPr>
+            <a:spLocks noGrp="1" noRot="1" noChangeAspect="1" noMove="1" noResize="1" noEditPoints="1" noAdjustHandles="1" noChangeArrowheads="1" noChangeShapeType="1" noTextEdit="1"/>
+          </p:cNvSpPr>
+          <p:nvPr>
+            <p:extLst>
+              <p:ext uri="{386F3935-93C4-4BCD-93E2-E3B085C9AB24}">
+                <p16:designElem xmlns:p16="http://schemas.microsoft.com/office/powerpoint/2015/main" val="1"/>
+              </p:ext>
+            </p:extLst>
+          </p:nvPr>
+        </p:nvSpPr>
+        <p:spPr>
+          <a:xfrm>
+            <a:off x="3474359" y="583345"/>
+            <a:ext cx="139039" cy="139039"/>
+          </a:xfrm>
+          <a:custGeom>
+            <a:avLst/>
+            <a:gdLst>
+              <a:gd name="connsiteX0" fmla="*/ 129602 w 139039"/>
+              <a:gd name="connsiteY0" fmla="*/ 60082 h 139039"/>
+              <a:gd name="connsiteX1" fmla="*/ 78957 w 139039"/>
+              <a:gd name="connsiteY1" fmla="*/ 60082 h 139039"/>
+              <a:gd name="connsiteX2" fmla="*/ 78957 w 139039"/>
+              <a:gd name="connsiteY2" fmla="*/ 9437 h 139039"/>
+              <a:gd name="connsiteX3" fmla="*/ 69520 w 139039"/>
+              <a:gd name="connsiteY3" fmla="*/ 0 h 139039"/>
+              <a:gd name="connsiteX4" fmla="*/ 60082 w 139039"/>
+              <a:gd name="connsiteY4" fmla="*/ 9437 h 139039"/>
+              <a:gd name="connsiteX5" fmla="*/ 60082 w 139039"/>
+              <a:gd name="connsiteY5" fmla="*/ 60082 h 139039"/>
+              <a:gd name="connsiteX6" fmla="*/ 9437 w 139039"/>
+              <a:gd name="connsiteY6" fmla="*/ 60082 h 139039"/>
+              <a:gd name="connsiteX7" fmla="*/ 0 w 139039"/>
+              <a:gd name="connsiteY7" fmla="*/ 69520 h 139039"/>
+              <a:gd name="connsiteX8" fmla="*/ 9437 w 139039"/>
+              <a:gd name="connsiteY8" fmla="*/ 78957 h 139039"/>
+              <a:gd name="connsiteX9" fmla="*/ 60082 w 139039"/>
+              <a:gd name="connsiteY9" fmla="*/ 78957 h 139039"/>
+              <a:gd name="connsiteX10" fmla="*/ 60082 w 139039"/>
+              <a:gd name="connsiteY10" fmla="*/ 129602 h 139039"/>
+              <a:gd name="connsiteX11" fmla="*/ 69520 w 139039"/>
+              <a:gd name="connsiteY11" fmla="*/ 139039 h 139039"/>
+              <a:gd name="connsiteX12" fmla="*/ 78957 w 139039"/>
+              <a:gd name="connsiteY12" fmla="*/ 129602 h 139039"/>
+              <a:gd name="connsiteX13" fmla="*/ 78957 w 139039"/>
+              <a:gd name="connsiteY13" fmla="*/ 78957 h 139039"/>
+              <a:gd name="connsiteX14" fmla="*/ 129602 w 139039"/>
+              <a:gd name="connsiteY14" fmla="*/ 78957 h 139039"/>
+              <a:gd name="connsiteX15" fmla="*/ 139039 w 139039"/>
+              <a:gd name="connsiteY15" fmla="*/ 69520 h 139039"/>
+              <a:gd name="connsiteX16" fmla="*/ 129602 w 139039"/>
+              <a:gd name="connsiteY16" fmla="*/ 60082 h 139039"/>
+            </a:gdLst>
+            <a:ahLst/>
+            <a:cxnLst>
+              <a:cxn ang="0">
+                <a:pos x="connsiteX0" y="connsiteY0"/>
+              </a:cxn>
+              <a:cxn ang="0">
+                <a:pos x="connsiteX1" y="connsiteY1"/>
+              </a:cxn>
+              <a:cxn ang="0">
+                <a:pos x="connsiteX2" y="connsiteY2"/>
+              </a:cxn>
+              <a:cxn ang="0">
+                <a:pos x="connsiteX3" y="connsiteY3"/>
+              </a:cxn>
+              <a:cxn ang="0">
+                <a:pos x="connsiteX4" y="connsiteY4"/>
+              </a:cxn>
+              <a:cxn ang="0">
+                <a:pos x="connsiteX5" y="connsiteY5"/>
+              </a:cxn>
+              <a:cxn ang="0">
+                <a:pos x="connsiteX6" y="connsiteY6"/>
+              </a:cxn>
+              <a:cxn ang="0">
+                <a:pos x="connsiteX7" y="connsiteY7"/>
+              </a:cxn>
+              <a:cxn ang="0">
+                <a:pos x="connsiteX8" y="connsiteY8"/>
+              </a:cxn>
+              <a:cxn ang="0">
+                <a:pos x="connsiteX9" y="connsiteY9"/>
+              </a:cxn>
+              <a:cxn ang="0">
+                <a:pos x="connsiteX10" y="connsiteY10"/>
+              </a:cxn>
+              <a:cxn ang="0">
+                <a:pos x="connsiteX11" y="connsiteY11"/>
+              </a:cxn>
+              <a:cxn ang="0">
+                <a:pos x="connsiteX12" y="connsiteY12"/>
+              </a:cxn>
+              <a:cxn ang="0">
+                <a:pos x="connsiteX13" y="connsiteY13"/>
+              </a:cxn>
+              <a:cxn ang="0">
+                <a:pos x="connsiteX14" y="connsiteY14"/>
+              </a:cxn>
+              <a:cxn ang="0">
+                <a:pos x="connsiteX15" y="connsiteY15"/>
+              </a:cxn>
+              <a:cxn ang="0">
+                <a:pos x="connsiteX16" y="connsiteY16"/>
+              </a:cxn>
+            </a:cxnLst>
+            <a:rect l="l" t="t" r="r" b="b"/>
+            <a:pathLst>
+              <a:path w="139039" h="139039">
+                <a:moveTo>
+                  <a:pt x="129602" y="60082"/>
+                </a:moveTo>
+                <a:lnTo>
+                  <a:pt x="78957" y="60082"/>
+                </a:lnTo>
+                <a:lnTo>
+                  <a:pt x="78957" y="9437"/>
+                </a:lnTo>
+                <a:cubicBezTo>
+                  <a:pt x="78957" y="4225"/>
+                  <a:pt x="74731" y="0"/>
+                  <a:pt x="69520" y="0"/>
+                </a:cubicBezTo>
+                <a:cubicBezTo>
+                  <a:pt x="64308" y="0"/>
+                  <a:pt x="60082" y="4225"/>
+                  <a:pt x="60082" y="9437"/>
+                </a:cubicBezTo>
+                <a:lnTo>
+                  <a:pt x="60082" y="60082"/>
+                </a:lnTo>
+                <a:lnTo>
+                  <a:pt x="9437" y="60082"/>
+                </a:lnTo>
+                <a:cubicBezTo>
+                  <a:pt x="4225" y="60082"/>
+                  <a:pt x="0" y="64308"/>
+                  <a:pt x="0" y="69520"/>
+                </a:cubicBezTo>
+                <a:cubicBezTo>
+                  <a:pt x="0" y="74731"/>
+                  <a:pt x="4225" y="78957"/>
+                  <a:pt x="9437" y="78957"/>
+                </a:cubicBezTo>
+                <a:lnTo>
+                  <a:pt x="60082" y="78957"/>
+                </a:lnTo>
+                <a:lnTo>
+                  <a:pt x="60082" y="129602"/>
+                </a:lnTo>
+                <a:cubicBezTo>
+                  <a:pt x="60082" y="134814"/>
+                  <a:pt x="64308" y="139039"/>
+                  <a:pt x="69520" y="139039"/>
+                </a:cubicBezTo>
+                <a:cubicBezTo>
+                  <a:pt x="74731" y="139039"/>
+                  <a:pt x="78957" y="134814"/>
+                  <a:pt x="78957" y="129602"/>
+                </a:cubicBezTo>
+                <a:lnTo>
+                  <a:pt x="78957" y="78957"/>
+                </a:lnTo>
+                <a:lnTo>
+                  <a:pt x="129602" y="78957"/>
+                </a:lnTo>
+                <a:cubicBezTo>
+                  <a:pt x="134814" y="78957"/>
+                  <a:pt x="139039" y="74731"/>
+                  <a:pt x="139039" y="69520"/>
+                </a:cubicBezTo>
+                <a:cubicBezTo>
+                  <a:pt x="139039" y="64308"/>
+                  <a:pt x="134814" y="60082"/>
+                  <a:pt x="129602" y="60082"/>
+                </a:cubicBezTo>
+                <a:close/>
+              </a:path>
+            </a:pathLst>
+          </a:custGeom>
+          <a:solidFill>
+            <a:schemeClr val="bg1"/>
+          </a:solidFill>
+          <a:ln w="603" cap="flat">
+            <a:noFill/>
+            <a:prstDash val="solid"/>
+            <a:miter/>
+          </a:ln>
+        </p:spPr>
+        <p:txBody>
+          <a:bodyPr rtlCol="0" anchor="ctr"/>
+          <a:lstStyle/>
+          <a:p>
+            <a:endParaRPr lang="en-US"/>
+          </a:p>
+        </p:txBody>
+      </p:sp>
+      <p:sp>
+        <p:nvSpPr>
+          <p:cNvPr id="14" name="Graphic 12">
+            <a:extLst>
+              <a:ext uri="{FF2B5EF4-FFF2-40B4-BE49-F238E27FC236}">
+                <a16:creationId xmlns:a16="http://schemas.microsoft.com/office/drawing/2014/main" id="{712D4376-A578-4FF1-94FC-245E7A6A489F}"/>
+              </a:ext>
+              <a:ext uri="{C183D7F6-B498-43B3-948B-1728B52AA6E4}">
+                <adec:decorative xmlns:adec="http://schemas.microsoft.com/office/drawing/2017/decorative" val="1"/>
+              </a:ext>
+            </a:extLst>
+          </p:cNvPr>
+          <p:cNvSpPr>
+            <a:spLocks noGrp="1" noRot="1" noChangeAspect="1" noMove="1" noResize="1" noEditPoints="1" noAdjustHandles="1" noChangeArrowheads="1" noChangeShapeType="1" noTextEdit="1"/>
+          </p:cNvSpPr>
+          <p:nvPr>
+            <p:extLst>
+              <p:ext uri="{386F3935-93C4-4BCD-93E2-E3B085C9AB24}">
+                <p16:designElem xmlns:p16="http://schemas.microsoft.com/office/powerpoint/2015/main" val="1"/>
+              </p:ext>
+            </p:extLst>
+          </p:nvPr>
+        </p:nvSpPr>
+        <p:spPr>
+          <a:xfrm>
+            <a:off x="3833139" y="812640"/>
+            <a:ext cx="91138" cy="91138"/>
+          </a:xfrm>
+          <a:custGeom>
+            <a:avLst/>
+            <a:gdLst>
+              <a:gd name="connsiteX0" fmla="*/ 91138 w 91138"/>
+              <a:gd name="connsiteY0" fmla="*/ 45569 h 91138"/>
+              <a:gd name="connsiteX1" fmla="*/ 45569 w 91138"/>
+              <a:gd name="connsiteY1" fmla="*/ 91138 h 91138"/>
+              <a:gd name="connsiteX2" fmla="*/ 0 w 91138"/>
+              <a:gd name="connsiteY2" fmla="*/ 45569 h 91138"/>
+              <a:gd name="connsiteX3" fmla="*/ 45569 w 91138"/>
+              <a:gd name="connsiteY3" fmla="*/ 0 h 91138"/>
+              <a:gd name="connsiteX4" fmla="*/ 91138 w 91138"/>
+              <a:gd name="connsiteY4" fmla="*/ 45569 h 91138"/>
+            </a:gdLst>
+            <a:ahLst/>
+            <a:cxnLst>
+              <a:cxn ang="0">
+                <a:pos x="connsiteX0" y="connsiteY0"/>
+              </a:cxn>
+              <a:cxn ang="0">
+                <a:pos x="connsiteX1" y="connsiteY1"/>
+              </a:cxn>
+              <a:cxn ang="0">
+                <a:pos x="connsiteX2" y="connsiteY2"/>
+              </a:cxn>
+              <a:cxn ang="0">
+                <a:pos x="connsiteX3" y="connsiteY3"/>
+              </a:cxn>
+              <a:cxn ang="0">
+                <a:pos x="connsiteX4" y="connsiteY4"/>
+              </a:cxn>
+            </a:cxnLst>
+            <a:rect l="l" t="t" r="r" b="b"/>
+            <a:pathLst>
+              <a:path w="91138" h="91138">
+                <a:moveTo>
+                  <a:pt x="91138" y="45569"/>
+                </a:moveTo>
+                <a:cubicBezTo>
+                  <a:pt x="91138" y="70736"/>
+                  <a:pt x="70736" y="91138"/>
+                  <a:pt x="45569" y="91138"/>
+                </a:cubicBezTo>
+                <a:cubicBezTo>
+                  <a:pt x="20402" y="91138"/>
+                  <a:pt x="0" y="70736"/>
+                  <a:pt x="0" y="45569"/>
+                </a:cubicBezTo>
+                <a:cubicBezTo>
+                  <a:pt x="0" y="20402"/>
+                  <a:pt x="20402" y="0"/>
+                  <a:pt x="45569" y="0"/>
+                </a:cubicBezTo>
+                <a:cubicBezTo>
+                  <a:pt x="70736" y="0"/>
+                  <a:pt x="91138" y="20402"/>
+                  <a:pt x="91138" y="45569"/>
+                </a:cubicBezTo>
+                <a:close/>
+              </a:path>
+            </a:pathLst>
+          </a:custGeom>
+          <a:solidFill>
+            <a:schemeClr val="bg1"/>
+          </a:solidFill>
+          <a:ln w="422" cap="flat">
+            <a:noFill/>
+            <a:prstDash val="solid"/>
+            <a:miter/>
+          </a:ln>
+        </p:spPr>
+        <p:txBody>
+          <a:bodyPr rtlCol="0" anchor="ctr"/>
+          <a:lstStyle/>
+          <a:p>
+            <a:endParaRPr lang="en-US"/>
+          </a:p>
+        </p:txBody>
+      </p:sp>
+      <p:sp>
+        <p:nvSpPr>
+          <p:cNvPr id="16" name="Graphic 15">
+            <a:extLst>
+              <a:ext uri="{FF2B5EF4-FFF2-40B4-BE49-F238E27FC236}">
+                <a16:creationId xmlns:a16="http://schemas.microsoft.com/office/drawing/2014/main" id="{AEA7509D-F04F-40CB-A0B3-EEF16499CC9F}"/>
+              </a:ext>
+              <a:ext uri="{C183D7F6-B498-43B3-948B-1728B52AA6E4}">
+                <adec:decorative xmlns:adec="http://schemas.microsoft.com/office/drawing/2017/decorative" val="1"/>
+              </a:ext>
+            </a:extLst>
+          </p:cNvPr>
+          <p:cNvSpPr>
+            <a:spLocks noGrp="1" noRot="1" noChangeAspect="1" noMove="1" noResize="1" noEditPoints="1" noAdjustHandles="1" noChangeArrowheads="1" noChangeShapeType="1" noTextEdit="1"/>
+          </p:cNvSpPr>
+          <p:nvPr>
+            <p:extLst>
+              <p:ext uri="{386F3935-93C4-4BCD-93E2-E3B085C9AB24}">
+                <p16:designElem xmlns:p16="http://schemas.microsoft.com/office/powerpoint/2015/main" val="1"/>
+              </p:ext>
+            </p:extLst>
+          </p:nvPr>
+        </p:nvSpPr>
+        <p:spPr>
+          <a:xfrm>
+            <a:off x="3458819" y="1037066"/>
+            <a:ext cx="127714" cy="127714"/>
+          </a:xfrm>
+          <a:custGeom>
+            <a:avLst/>
+            <a:gdLst>
+              <a:gd name="connsiteX0" fmla="*/ 63857 w 127714"/>
+              <a:gd name="connsiteY0" fmla="*/ 18874 h 127714"/>
+              <a:gd name="connsiteX1" fmla="*/ 108840 w 127714"/>
+              <a:gd name="connsiteY1" fmla="*/ 63857 h 127714"/>
+              <a:gd name="connsiteX2" fmla="*/ 63857 w 127714"/>
+              <a:gd name="connsiteY2" fmla="*/ 108840 h 127714"/>
+              <a:gd name="connsiteX3" fmla="*/ 18874 w 127714"/>
+              <a:gd name="connsiteY3" fmla="*/ 63857 h 127714"/>
+              <a:gd name="connsiteX4" fmla="*/ 63857 w 127714"/>
+              <a:gd name="connsiteY4" fmla="*/ 18874 h 127714"/>
+              <a:gd name="connsiteX5" fmla="*/ 63857 w 127714"/>
+              <a:gd name="connsiteY5" fmla="*/ 0 h 127714"/>
+              <a:gd name="connsiteX6" fmla="*/ 0 w 127714"/>
+              <a:gd name="connsiteY6" fmla="*/ 63857 h 127714"/>
+              <a:gd name="connsiteX7" fmla="*/ 63857 w 127714"/>
+              <a:gd name="connsiteY7" fmla="*/ 127714 h 127714"/>
+              <a:gd name="connsiteX8" fmla="*/ 127714 w 127714"/>
+              <a:gd name="connsiteY8" fmla="*/ 63857 h 127714"/>
+              <a:gd name="connsiteX9" fmla="*/ 63857 w 127714"/>
+              <a:gd name="connsiteY9" fmla="*/ 0 h 127714"/>
+            </a:gdLst>
+            <a:ahLst/>
+            <a:cxnLst>
+              <a:cxn ang="0">
+                <a:pos x="connsiteX0" y="connsiteY0"/>
+              </a:cxn>
+              <a:cxn ang="0">
+                <a:pos x="connsiteX1" y="connsiteY1"/>
+              </a:cxn>
+              <a:cxn ang="0">
+                <a:pos x="connsiteX2" y="connsiteY2"/>
+              </a:cxn>
+              <a:cxn ang="0">
+                <a:pos x="connsiteX3" y="connsiteY3"/>
+              </a:cxn>
+              <a:cxn ang="0">
+                <a:pos x="connsiteX4" y="connsiteY4"/>
+              </a:cxn>
+              <a:cxn ang="0">
+                <a:pos x="connsiteX5" y="connsiteY5"/>
+              </a:cxn>
+              <a:cxn ang="0">
+                <a:pos x="connsiteX6" y="connsiteY6"/>
+              </a:cxn>
+              <a:cxn ang="0">
+                <a:pos x="connsiteX7" y="connsiteY7"/>
+              </a:cxn>
+              <a:cxn ang="0">
+                <a:pos x="connsiteX8" y="connsiteY8"/>
+              </a:cxn>
+              <a:cxn ang="0">
+                <a:pos x="connsiteX9" y="connsiteY9"/>
+              </a:cxn>
+            </a:cxnLst>
+            <a:rect l="l" t="t" r="r" b="b"/>
+            <a:pathLst>
+              <a:path w="127714" h="127714">
+                <a:moveTo>
+                  <a:pt x="63857" y="18874"/>
+                </a:moveTo>
+                <a:cubicBezTo>
+                  <a:pt x="88700" y="18874"/>
+                  <a:pt x="108840" y="39014"/>
+                  <a:pt x="108840" y="63857"/>
+                </a:cubicBezTo>
+                <a:cubicBezTo>
+                  <a:pt x="108840" y="88700"/>
+                  <a:pt x="88700" y="108840"/>
+                  <a:pt x="63857" y="108840"/>
+                </a:cubicBezTo>
+                <a:cubicBezTo>
+                  <a:pt x="39014" y="108840"/>
+                  <a:pt x="18874" y="88700"/>
+                  <a:pt x="18874" y="63857"/>
+                </a:cubicBezTo>
+                <a:cubicBezTo>
+                  <a:pt x="18898" y="39024"/>
+                  <a:pt x="39024" y="18898"/>
+                  <a:pt x="63857" y="18874"/>
+                </a:cubicBezTo>
+                <a:moveTo>
+                  <a:pt x="63857" y="0"/>
+                </a:moveTo>
+                <a:cubicBezTo>
+                  <a:pt x="28590" y="0"/>
+                  <a:pt x="0" y="28590"/>
+                  <a:pt x="0" y="63857"/>
+                </a:cubicBezTo>
+                <a:cubicBezTo>
+                  <a:pt x="0" y="99124"/>
+                  <a:pt x="28590" y="127714"/>
+                  <a:pt x="63857" y="127714"/>
+                </a:cubicBezTo>
+                <a:cubicBezTo>
+                  <a:pt x="99124" y="127714"/>
+                  <a:pt x="127714" y="99124"/>
+                  <a:pt x="127714" y="63857"/>
+                </a:cubicBezTo>
+                <a:cubicBezTo>
+                  <a:pt x="127714" y="28590"/>
+                  <a:pt x="99124" y="0"/>
+                  <a:pt x="63857" y="0"/>
+                </a:cubicBezTo>
+                <a:close/>
+              </a:path>
+            </a:pathLst>
+          </a:custGeom>
+          <a:solidFill>
+            <a:schemeClr val="bg1"/>
+          </a:solidFill>
+          <a:ln w="610" cap="flat">
+            <a:noFill/>
+            <a:prstDash val="solid"/>
+            <a:miter/>
+          </a:ln>
+        </p:spPr>
+        <p:txBody>
+          <a:bodyPr rtlCol="0" anchor="ctr"/>
+          <a:lstStyle/>
+          <a:p>
+            <a:endParaRPr lang="en-US"/>
+          </a:p>
+        </p:txBody>
+      </p:sp>
+      <p:cxnSp>
+        <p:nvCxnSpPr>
+          <p:cNvPr id="18" name="Straight Connector 17">
+            <a:extLst>
+              <a:ext uri="{FF2B5EF4-FFF2-40B4-BE49-F238E27FC236}">
+                <a16:creationId xmlns:a16="http://schemas.microsoft.com/office/drawing/2014/main" id="{56020367-4FD5-4596-8E10-C5F095CD8DBF}"/>
+              </a:ext>
+              <a:ext uri="{C183D7F6-B498-43B3-948B-1728B52AA6E4}">
+                <adec:decorative xmlns:adec="http://schemas.microsoft.com/office/drawing/2017/decorative" val="1"/>
+              </a:ext>
+            </a:extLst>
+          </p:cNvPr>
+          <p:cNvCxnSpPr>
+            <a:cxnSpLocks noGrp="1" noRot="1" noChangeAspect="1" noMove="1" noResize="1" noEditPoints="1" noAdjustHandles="1" noChangeArrowheads="1" noChangeShapeType="1"/>
+          </p:cNvCxnSpPr>
+          <p:nvPr>
+            <p:extLst>
+              <p:ext uri="{386F3935-93C4-4BCD-93E2-E3B085C9AB24}">
+                <p16:designElem xmlns:p16="http://schemas.microsoft.com/office/powerpoint/2015/main" val="1"/>
+              </p:ext>
+            </p:extLst>
+          </p:nvPr>
+        </p:nvCxnSpPr>
+        <p:spPr>
+          <a:xfrm>
+            <a:off x="856114" y="3503032"/>
+            <a:ext cx="0" cy="3346090"/>
+          </a:xfrm>
+          <a:prstGeom prst="line">
+            <a:avLst/>
+          </a:prstGeom>
+          <a:ln w="25400" cap="sq">
+            <a:solidFill>
+              <a:schemeClr val="bg1"/>
+            </a:solidFill>
+            <a:bevel/>
+          </a:ln>
+        </p:spPr>
+        <p:style>
+          <a:lnRef idx="1">
+            <a:schemeClr val="accent1"/>
+          </a:lnRef>
+          <a:fillRef idx="0">
+            <a:schemeClr val="accent1"/>
+          </a:fillRef>
+          <a:effectRef idx="0">
+            <a:schemeClr val="accent1"/>
+          </a:effectRef>
+          <a:fontRef idx="minor">
+            <a:schemeClr val="tx1"/>
+          </a:fontRef>
+        </p:style>
+      </p:cxnSp>
+      <p:sp>
+        <p:nvSpPr>
+          <p:cNvPr id="20" name="Graphic 22">
+            <a:extLst>
+              <a:ext uri="{FF2B5EF4-FFF2-40B4-BE49-F238E27FC236}">
+                <a16:creationId xmlns:a16="http://schemas.microsoft.com/office/drawing/2014/main" id="{508BEF50-7B1E-49A4-BC19-5F4F1D755E64}"/>
+              </a:ext>
+              <a:ext uri="{C183D7F6-B498-43B3-948B-1728B52AA6E4}">
+                <adec:decorative xmlns:adec="http://schemas.microsoft.com/office/drawing/2017/decorative" val="1"/>
+              </a:ext>
+            </a:extLst>
+          </p:cNvPr>
+          <p:cNvSpPr>
+            <a:spLocks noGrp="1" noRot="1" noChangeAspect="1" noMove="1" noResize="1" noEditPoints="1" noAdjustHandles="1" noChangeArrowheads="1" noChangeShapeType="1" noTextEdit="1"/>
+          </p:cNvSpPr>
+          <p:nvPr>
+            <p:extLst>
+              <p:ext uri="{386F3935-93C4-4BCD-93E2-E3B085C9AB24}">
+                <p16:designElem xmlns:p16="http://schemas.microsoft.com/office/powerpoint/2015/main" val="1"/>
+              </p:ext>
+            </p:extLst>
+          </p:nvPr>
+        </p:nvSpPr>
+        <p:spPr>
+          <a:xfrm>
+            <a:off x="10836425" y="5636680"/>
+            <a:ext cx="151536" cy="151536"/>
+          </a:xfrm>
+          <a:custGeom>
+            <a:avLst/>
+            <a:gdLst>
+              <a:gd name="connsiteX0" fmla="*/ 141251 w 151536"/>
+              <a:gd name="connsiteY0" fmla="*/ 65483 h 151536"/>
+              <a:gd name="connsiteX1" fmla="*/ 86053 w 151536"/>
+              <a:gd name="connsiteY1" fmla="*/ 65483 h 151536"/>
+              <a:gd name="connsiteX2" fmla="*/ 86053 w 151536"/>
+              <a:gd name="connsiteY2" fmla="*/ 10285 h 151536"/>
+              <a:gd name="connsiteX3" fmla="*/ 75768 w 151536"/>
+              <a:gd name="connsiteY3" fmla="*/ 0 h 151536"/>
+              <a:gd name="connsiteX4" fmla="*/ 65483 w 151536"/>
+              <a:gd name="connsiteY4" fmla="*/ 10285 h 151536"/>
+              <a:gd name="connsiteX5" fmla="*/ 65483 w 151536"/>
+              <a:gd name="connsiteY5" fmla="*/ 65483 h 151536"/>
+              <a:gd name="connsiteX6" fmla="*/ 10285 w 151536"/>
+              <a:gd name="connsiteY6" fmla="*/ 65483 h 151536"/>
+              <a:gd name="connsiteX7" fmla="*/ 0 w 151536"/>
+              <a:gd name="connsiteY7" fmla="*/ 75768 h 151536"/>
+              <a:gd name="connsiteX8" fmla="*/ 10285 w 151536"/>
+              <a:gd name="connsiteY8" fmla="*/ 86053 h 151536"/>
+              <a:gd name="connsiteX9" fmla="*/ 65483 w 151536"/>
+              <a:gd name="connsiteY9" fmla="*/ 86053 h 151536"/>
+              <a:gd name="connsiteX10" fmla="*/ 65483 w 151536"/>
+              <a:gd name="connsiteY10" fmla="*/ 141251 h 151536"/>
+              <a:gd name="connsiteX11" fmla="*/ 75768 w 151536"/>
+              <a:gd name="connsiteY11" fmla="*/ 151536 h 151536"/>
+              <a:gd name="connsiteX12" fmla="*/ 86053 w 151536"/>
+              <a:gd name="connsiteY12" fmla="*/ 141251 h 151536"/>
+              <a:gd name="connsiteX13" fmla="*/ 86053 w 151536"/>
+              <a:gd name="connsiteY13" fmla="*/ 86053 h 151536"/>
+              <a:gd name="connsiteX14" fmla="*/ 141251 w 151536"/>
+              <a:gd name="connsiteY14" fmla="*/ 86053 h 151536"/>
+              <a:gd name="connsiteX15" fmla="*/ 151536 w 151536"/>
+              <a:gd name="connsiteY15" fmla="*/ 75768 h 151536"/>
+              <a:gd name="connsiteX16" fmla="*/ 141251 w 151536"/>
+              <a:gd name="connsiteY16" fmla="*/ 65483 h 151536"/>
+            </a:gdLst>
+            <a:ahLst/>
+            <a:cxnLst>
+              <a:cxn ang="0">
+                <a:pos x="connsiteX0" y="connsiteY0"/>
+              </a:cxn>
+              <a:cxn ang="0">
+                <a:pos x="connsiteX1" y="connsiteY1"/>
+              </a:cxn>
+              <a:cxn ang="0">
+                <a:pos x="connsiteX2" y="connsiteY2"/>
+              </a:cxn>
+              <a:cxn ang="0">
+                <a:pos x="connsiteX3" y="connsiteY3"/>
+              </a:cxn>
+              <a:cxn ang="0">
+                <a:pos x="connsiteX4" y="connsiteY4"/>
+              </a:cxn>
+              <a:cxn ang="0">
+                <a:pos x="connsiteX5" y="connsiteY5"/>
+              </a:cxn>
+              <a:cxn ang="0">
+                <a:pos x="connsiteX6" y="connsiteY6"/>
+              </a:cxn>
+              <a:cxn ang="0">
+                <a:pos x="connsiteX7" y="connsiteY7"/>
+              </a:cxn>
+              <a:cxn ang="0">
+                <a:pos x="connsiteX8" y="connsiteY8"/>
+              </a:cxn>
+              <a:cxn ang="0">
+                <a:pos x="connsiteX9" y="connsiteY9"/>
+              </a:cxn>
+              <a:cxn ang="0">
+                <a:pos x="connsiteX10" y="connsiteY10"/>
+              </a:cxn>
+              <a:cxn ang="0">
+                <a:pos x="connsiteX11" y="connsiteY11"/>
+              </a:cxn>
+              <a:cxn ang="0">
+                <a:pos x="connsiteX12" y="connsiteY12"/>
+              </a:cxn>
+              <a:cxn ang="0">
+                <a:pos x="connsiteX13" y="connsiteY13"/>
+              </a:cxn>
+              <a:cxn ang="0">
+                <a:pos x="connsiteX14" y="connsiteY14"/>
+              </a:cxn>
+              <a:cxn ang="0">
+                <a:pos x="connsiteX15" y="connsiteY15"/>
+              </a:cxn>
+              <a:cxn ang="0">
+                <a:pos x="connsiteX16" y="connsiteY16"/>
+              </a:cxn>
+            </a:cxnLst>
+            <a:rect l="l" t="t" r="r" b="b"/>
+            <a:pathLst>
+              <a:path w="151536" h="151536">
+                <a:moveTo>
+                  <a:pt x="141251" y="65483"/>
+                </a:moveTo>
+                <a:lnTo>
+                  <a:pt x="86053" y="65483"/>
+                </a:lnTo>
+                <a:lnTo>
+                  <a:pt x="86053" y="10285"/>
+                </a:lnTo>
+                <a:cubicBezTo>
+                  <a:pt x="86053" y="4605"/>
+                  <a:pt x="81448" y="0"/>
+                  <a:pt x="75768" y="0"/>
+                </a:cubicBezTo>
+                <a:cubicBezTo>
+                  <a:pt x="70088" y="0"/>
+                  <a:pt x="65483" y="4605"/>
+                  <a:pt x="65483" y="10285"/>
+                </a:cubicBezTo>
+                <a:lnTo>
+                  <a:pt x="65483" y="65483"/>
+                </a:lnTo>
+                <a:lnTo>
+                  <a:pt x="10285" y="65483"/>
+                </a:lnTo>
+                <a:cubicBezTo>
+                  <a:pt x="4605" y="65483"/>
+                  <a:pt x="0" y="70088"/>
+                  <a:pt x="0" y="75768"/>
+                </a:cubicBezTo>
+                <a:cubicBezTo>
+                  <a:pt x="0" y="81448"/>
+                  <a:pt x="4605" y="86053"/>
+                  <a:pt x="10285" y="86053"/>
+                </a:cubicBezTo>
+                <a:lnTo>
+                  <a:pt x="65483" y="86053"/>
+                </a:lnTo>
+                <a:lnTo>
+                  <a:pt x="65483" y="141251"/>
+                </a:lnTo>
+                <a:cubicBezTo>
+                  <a:pt x="65483" y="146931"/>
+                  <a:pt x="70088" y="151536"/>
+                  <a:pt x="75768" y="151536"/>
+                </a:cubicBezTo>
+                <a:cubicBezTo>
+                  <a:pt x="81448" y="151536"/>
+                  <a:pt x="86053" y="146931"/>
+                  <a:pt x="86053" y="141251"/>
+                </a:cubicBezTo>
+                <a:lnTo>
+                  <a:pt x="86053" y="86053"/>
+                </a:lnTo>
+                <a:lnTo>
+                  <a:pt x="141251" y="86053"/>
+                </a:lnTo>
+                <a:cubicBezTo>
+                  <a:pt x="146931" y="86053"/>
+                  <a:pt x="151536" y="81448"/>
+                  <a:pt x="151536" y="75768"/>
+                </a:cubicBezTo>
+                <a:cubicBezTo>
+                  <a:pt x="151536" y="70088"/>
+                  <a:pt x="146931" y="65483"/>
+                  <a:pt x="141251" y="65483"/>
+                </a:cubicBezTo>
+                <a:close/>
+              </a:path>
+            </a:pathLst>
+          </a:custGeom>
+          <a:solidFill>
+            <a:schemeClr val="bg1"/>
+          </a:solidFill>
+          <a:ln w="646" cap="flat">
+            <a:noFill/>
+            <a:prstDash val="solid"/>
+            <a:miter/>
+          </a:ln>
+        </p:spPr>
+        <p:txBody>
+          <a:bodyPr rtlCol="0" anchor="ctr"/>
+          <a:lstStyle/>
+          <a:p>
+            <a:endParaRPr lang="en-US"/>
+          </a:p>
+        </p:txBody>
+      </p:sp>
+      <p:sp>
+        <p:nvSpPr>
+          <p:cNvPr id="22" name="Graphic 23">
+            <a:extLst>
+              <a:ext uri="{FF2B5EF4-FFF2-40B4-BE49-F238E27FC236}">
+                <a16:creationId xmlns:a16="http://schemas.microsoft.com/office/drawing/2014/main" id="{3FBAD350-5664-4811-A208-657FB882D350}"/>
+              </a:ext>
+              <a:ext uri="{C183D7F6-B498-43B3-948B-1728B52AA6E4}">
+                <adec:decorative xmlns:adec="http://schemas.microsoft.com/office/drawing/2017/decorative" val="1"/>
+              </a:ext>
+            </a:extLst>
+          </p:cNvPr>
+          <p:cNvSpPr>
+            <a:spLocks noGrp="1" noRot="1" noChangeAspect="1" noMove="1" noResize="1" noEditPoints="1" noAdjustHandles="1" noChangeArrowheads="1" noChangeShapeType="1" noTextEdit="1"/>
+          </p:cNvSpPr>
+          <p:nvPr>
+            <p:extLst>
+              <p:ext uri="{386F3935-93C4-4BCD-93E2-E3B085C9AB24}">
+                <p16:designElem xmlns:p16="http://schemas.microsoft.com/office/powerpoint/2015/main" val="1"/>
+              </p:ext>
+            </p:extLst>
+          </p:nvPr>
+        </p:nvSpPr>
+        <p:spPr>
+          <a:xfrm>
+            <a:off x="11245175" y="6096759"/>
+            <a:ext cx="108625" cy="108625"/>
+          </a:xfrm>
+          <a:custGeom>
+            <a:avLst/>
+            <a:gdLst>
+              <a:gd name="connsiteX0" fmla="*/ 54313 w 108625"/>
+              <a:gd name="connsiteY0" fmla="*/ 16053 h 108625"/>
+              <a:gd name="connsiteX1" fmla="*/ 92572 w 108625"/>
+              <a:gd name="connsiteY1" fmla="*/ 54313 h 108625"/>
+              <a:gd name="connsiteX2" fmla="*/ 54313 w 108625"/>
+              <a:gd name="connsiteY2" fmla="*/ 92572 h 108625"/>
+              <a:gd name="connsiteX3" fmla="*/ 16053 w 108625"/>
+              <a:gd name="connsiteY3" fmla="*/ 54313 h 108625"/>
+              <a:gd name="connsiteX4" fmla="*/ 54313 w 108625"/>
+              <a:gd name="connsiteY4" fmla="*/ 16053 h 108625"/>
+              <a:gd name="connsiteX5" fmla="*/ 54313 w 108625"/>
+              <a:gd name="connsiteY5" fmla="*/ 0 h 108625"/>
+              <a:gd name="connsiteX6" fmla="*/ 0 w 108625"/>
+              <a:gd name="connsiteY6" fmla="*/ 54313 h 108625"/>
+              <a:gd name="connsiteX7" fmla="*/ 54313 w 108625"/>
+              <a:gd name="connsiteY7" fmla="*/ 108625 h 108625"/>
+              <a:gd name="connsiteX8" fmla="*/ 108625 w 108625"/>
+              <a:gd name="connsiteY8" fmla="*/ 54313 h 108625"/>
+              <a:gd name="connsiteX9" fmla="*/ 54313 w 108625"/>
+              <a:gd name="connsiteY9" fmla="*/ 0 h 108625"/>
+            </a:gdLst>
+            <a:ahLst/>
+            <a:cxnLst>
+              <a:cxn ang="0">
+                <a:pos x="connsiteX0" y="connsiteY0"/>
+              </a:cxn>
+              <a:cxn ang="0">
+                <a:pos x="connsiteX1" y="connsiteY1"/>
+              </a:cxn>
+              <a:cxn ang="0">
+                <a:pos x="connsiteX2" y="connsiteY2"/>
+              </a:cxn>
+              <a:cxn ang="0">
+                <a:pos x="connsiteX3" y="connsiteY3"/>
+              </a:cxn>
+              <a:cxn ang="0">
+                <a:pos x="connsiteX4" y="connsiteY4"/>
+              </a:cxn>
+              <a:cxn ang="0">
+                <a:pos x="connsiteX5" y="connsiteY5"/>
+              </a:cxn>
+              <a:cxn ang="0">
+                <a:pos x="connsiteX6" y="connsiteY6"/>
+              </a:cxn>
+              <a:cxn ang="0">
+                <a:pos x="connsiteX7" y="connsiteY7"/>
+              </a:cxn>
+              <a:cxn ang="0">
+                <a:pos x="connsiteX8" y="connsiteY8"/>
+              </a:cxn>
+              <a:cxn ang="0">
+                <a:pos x="connsiteX9" y="connsiteY9"/>
+              </a:cxn>
+            </a:cxnLst>
+            <a:rect l="l" t="t" r="r" b="b"/>
+            <a:pathLst>
+              <a:path w="108625" h="108625">
+                <a:moveTo>
+                  <a:pt x="54313" y="16053"/>
+                </a:moveTo>
+                <a:cubicBezTo>
+                  <a:pt x="75442" y="16053"/>
+                  <a:pt x="92572" y="33182"/>
+                  <a:pt x="92572" y="54313"/>
+                </a:cubicBezTo>
+                <a:cubicBezTo>
+                  <a:pt x="92572" y="75442"/>
+                  <a:pt x="75442" y="92572"/>
+                  <a:pt x="54313" y="92572"/>
+                </a:cubicBezTo>
+                <a:cubicBezTo>
+                  <a:pt x="33182" y="92572"/>
+                  <a:pt x="16053" y="75442"/>
+                  <a:pt x="16053" y="54313"/>
+                </a:cubicBezTo>
+                <a:cubicBezTo>
+                  <a:pt x="16074" y="33191"/>
+                  <a:pt x="33191" y="16074"/>
+                  <a:pt x="54313" y="16053"/>
+                </a:cubicBezTo>
+                <a:moveTo>
+                  <a:pt x="54313" y="0"/>
+                </a:moveTo>
+                <a:cubicBezTo>
+                  <a:pt x="24317" y="0"/>
+                  <a:pt x="0" y="24317"/>
+                  <a:pt x="0" y="54313"/>
+                </a:cubicBezTo>
+                <a:cubicBezTo>
+                  <a:pt x="0" y="84309"/>
+                  <a:pt x="24317" y="108625"/>
+                  <a:pt x="54313" y="108625"/>
+                </a:cubicBezTo>
+                <a:cubicBezTo>
+                  <a:pt x="84309" y="108625"/>
+                  <a:pt x="108625" y="84309"/>
+                  <a:pt x="108625" y="54313"/>
+                </a:cubicBezTo>
+                <a:cubicBezTo>
+                  <a:pt x="108625" y="24317"/>
+                  <a:pt x="84309" y="0"/>
+                  <a:pt x="54313" y="0"/>
+                </a:cubicBezTo>
+                <a:close/>
+              </a:path>
+            </a:pathLst>
+          </a:custGeom>
+          <a:solidFill>
+            <a:schemeClr val="bg1"/>
+          </a:solidFill>
+          <a:ln w="516" cap="flat">
+            <a:noFill/>
+            <a:prstDash val="solid"/>
+            <a:miter/>
+          </a:ln>
+        </p:spPr>
+        <p:txBody>
+          <a:bodyPr rtlCol="0" anchor="ctr"/>
+          <a:lstStyle/>
+          <a:p>
+            <a:endParaRPr lang="en-US"/>
+          </a:p>
+        </p:txBody>
+      </p:sp>
+      <p:sp>
+        <p:nvSpPr>
+          <p:cNvPr id="24" name="Graphic 21">
+            <a:extLst>
+              <a:ext uri="{FF2B5EF4-FFF2-40B4-BE49-F238E27FC236}">
+                <a16:creationId xmlns:a16="http://schemas.microsoft.com/office/drawing/2014/main" id="{C39ADB8F-D187-49D7-BDCF-C1B6DC727068}"/>
+              </a:ext>
+              <a:ext uri="{C183D7F6-B498-43B3-948B-1728B52AA6E4}">
+                <adec:decorative xmlns:adec="http://schemas.microsoft.com/office/drawing/2017/decorative" val="1"/>
+              </a:ext>
+            </a:extLst>
+          </p:cNvPr>
+          <p:cNvSpPr>
+            <a:spLocks noGrp="1" noRot="1" noChangeAspect="1" noMove="1" noResize="1" noEditPoints="1" noAdjustHandles="1" noChangeArrowheads="1" noChangeShapeType="1" noTextEdit="1"/>
+          </p:cNvSpPr>
+          <p:nvPr>
+            <p:extLst>
+              <p:ext uri="{386F3935-93C4-4BCD-93E2-E3B085C9AB24}">
+                <p16:designElem xmlns:p16="http://schemas.microsoft.com/office/powerpoint/2015/main" val="1"/>
+              </p:ext>
+            </p:extLst>
+          </p:nvPr>
+        </p:nvSpPr>
+        <p:spPr>
+          <a:xfrm>
+            <a:off x="10554288" y="6238029"/>
+            <a:ext cx="95759" cy="95759"/>
+          </a:xfrm>
+          <a:custGeom>
+            <a:avLst/>
+            <a:gdLst>
+              <a:gd name="connsiteX0" fmla="*/ 95759 w 95759"/>
+              <a:gd name="connsiteY0" fmla="*/ 47880 h 95759"/>
+              <a:gd name="connsiteX1" fmla="*/ 47880 w 95759"/>
+              <a:gd name="connsiteY1" fmla="*/ 95759 h 95759"/>
+              <a:gd name="connsiteX2" fmla="*/ 0 w 95759"/>
+              <a:gd name="connsiteY2" fmla="*/ 47880 h 95759"/>
+              <a:gd name="connsiteX3" fmla="*/ 47880 w 95759"/>
+              <a:gd name="connsiteY3" fmla="*/ 0 h 95759"/>
+              <a:gd name="connsiteX4" fmla="*/ 95759 w 95759"/>
+              <a:gd name="connsiteY4" fmla="*/ 47880 h 95759"/>
+            </a:gdLst>
+            <a:ahLst/>
+            <a:cxnLst>
+              <a:cxn ang="0">
+                <a:pos x="connsiteX0" y="connsiteY0"/>
+              </a:cxn>
+              <a:cxn ang="0">
+                <a:pos x="connsiteX1" y="connsiteY1"/>
+              </a:cxn>
+              <a:cxn ang="0">
+                <a:pos x="connsiteX2" y="connsiteY2"/>
+              </a:cxn>
+              <a:cxn ang="0">
+                <a:pos x="connsiteX3" y="connsiteY3"/>
+              </a:cxn>
+              <a:cxn ang="0">
+                <a:pos x="connsiteX4" y="connsiteY4"/>
+              </a:cxn>
+            </a:cxnLst>
+            <a:rect l="l" t="t" r="r" b="b"/>
+            <a:pathLst>
+              <a:path w="95759" h="95759">
+                <a:moveTo>
+                  <a:pt x="95759" y="47880"/>
+                </a:moveTo>
+                <a:cubicBezTo>
+                  <a:pt x="95759" y="74323"/>
+                  <a:pt x="74323" y="95759"/>
+                  <a:pt x="47880" y="95759"/>
+                </a:cubicBezTo>
+                <a:cubicBezTo>
+                  <a:pt x="21436" y="95759"/>
+                  <a:pt x="0" y="74323"/>
+                  <a:pt x="0" y="47880"/>
+                </a:cubicBezTo>
+                <a:cubicBezTo>
+                  <a:pt x="0" y="21436"/>
+                  <a:pt x="21436" y="0"/>
+                  <a:pt x="47880" y="0"/>
+                </a:cubicBezTo>
+                <a:cubicBezTo>
+                  <a:pt x="74323" y="0"/>
+                  <a:pt x="95759" y="21436"/>
+                  <a:pt x="95759" y="47880"/>
+                </a:cubicBezTo>
+                <a:close/>
+              </a:path>
+            </a:pathLst>
+          </a:custGeom>
+          <a:solidFill>
+            <a:schemeClr val="bg1"/>
+          </a:solidFill>
+          <a:ln w="469" cap="flat">
+            <a:noFill/>
+            <a:prstDash val="solid"/>
+            <a:miter/>
+          </a:ln>
+        </p:spPr>
+        <p:txBody>
+          <a:bodyPr rtlCol="0" anchor="ctr"/>
+          <a:lstStyle/>
+          <a:p>
+            <a:endParaRPr lang="en-US"/>
+          </a:p>
+        </p:txBody>
+      </p:sp>
+      <p:sp>
+        <p:nvSpPr>
+          <p:cNvPr id="7" name="Título 1">
+            <a:extLst>
+              <a:ext uri="{FF2B5EF4-FFF2-40B4-BE49-F238E27FC236}">
+                <a16:creationId xmlns:a16="http://schemas.microsoft.com/office/drawing/2014/main" id="{6D2271A9-8FFF-79AE-3FA8-8CB8F2AC0631}"/>
+              </a:ext>
+            </a:extLst>
+          </p:cNvPr>
+          <p:cNvSpPr txBox="1">
+            <a:spLocks/>
+          </p:cNvSpPr>
+          <p:nvPr/>
+        </p:nvSpPr>
+        <p:spPr>
+          <a:xfrm>
+            <a:off x="1176197" y="1724554"/>
+            <a:ext cx="9839606" cy="4320806"/>
+          </a:xfrm>
+          <a:prstGeom prst="rect">
+            <a:avLst/>
+          </a:prstGeom>
+        </p:spPr>
+        <p:txBody>
+          <a:bodyPr vert="horz" lIns="91440" tIns="45720" rIns="91440" bIns="45720" rtlCol="0" anchor="ctr">
+            <a:noAutofit/>
+          </a:bodyPr>
+          <a:lstStyle>
+            <a:lvl1pPr algn="l" defTabSz="914400" rtl="0" eaLnBrk="1" latinLnBrk="0" hangingPunct="1">
+              <a:lnSpc>
+                <a:spcPct val="90000"/>
+              </a:lnSpc>
+              <a:spcBef>
+                <a:spcPct val="0"/>
+              </a:spcBef>
+              <a:buNone/>
+              <a:defRPr sz="4800" kern="1200">
+                <a:solidFill>
+                  <a:schemeClr val="tx1"/>
+                </a:solidFill>
+                <a:latin typeface="+mj-lt"/>
+                <a:ea typeface="+mj-ea"/>
+                <a:cs typeface="+mj-cs"/>
+              </a:defRPr>
+            </a:lvl1pPr>
+          </a:lstStyle>
+          <a:p>
+            <a:r>
+              <a:rPr lang="es-MX" sz="2800" b="1" dirty="0">
+                <a:solidFill>
+                  <a:schemeClr val="bg1"/>
+                </a:solidFill>
+                <a:latin typeface="Microsoft YaHei" panose="020B0503020204020204" pitchFamily="34" charset="-122"/>
+                <a:ea typeface="Microsoft YaHei" panose="020B0503020204020204" pitchFamily="34" charset="-122"/>
+              </a:rPr>
+              <a:t>Tableau Dashboard 1:</a:t>
+            </a:r>
+          </a:p>
+          <a:p>
+            <a:r>
+              <a:rPr lang="es-MX" sz="2000" dirty="0">
+                <a:solidFill>
+                  <a:schemeClr val="bg1"/>
+                </a:solidFill>
+                <a:latin typeface="Microsoft YaHei" panose="020B0503020204020204" pitchFamily="34" charset="-122"/>
+                <a:ea typeface="Microsoft YaHei" panose="020B0503020204020204" pitchFamily="34" charset="-122"/>
+              </a:rPr>
+              <a:t>https://public.tableau.com/views/DataTranslationCaseDashboard1/Dashboard1?:language=es-ES&amp;publish=yes&amp;:display_count=n&amp;:origin=viz_share_link</a:t>
+            </a:r>
+          </a:p>
+          <a:p>
+            <a:endParaRPr lang="es-MX" sz="2000" dirty="0">
+              <a:solidFill>
+                <a:schemeClr val="bg1"/>
+              </a:solidFill>
+              <a:latin typeface="Microsoft YaHei" panose="020B0503020204020204" pitchFamily="34" charset="-122"/>
+              <a:ea typeface="Microsoft YaHei" panose="020B0503020204020204" pitchFamily="34" charset="-122"/>
+            </a:endParaRPr>
+          </a:p>
+          <a:p>
+            <a:r>
+              <a:rPr lang="es-MX" sz="2800" b="1" dirty="0">
+                <a:solidFill>
+                  <a:schemeClr val="bg1"/>
+                </a:solidFill>
+                <a:latin typeface="Microsoft YaHei" panose="020B0503020204020204" pitchFamily="34" charset="-122"/>
+                <a:ea typeface="Microsoft YaHei" panose="020B0503020204020204" pitchFamily="34" charset="-122"/>
+              </a:rPr>
+              <a:t>Tableau Dashboard 2:</a:t>
+            </a:r>
+          </a:p>
+          <a:p>
+            <a:r>
+              <a:rPr lang="es-MX" sz="2000" dirty="0">
+                <a:solidFill>
+                  <a:schemeClr val="bg1"/>
+                </a:solidFill>
+                <a:latin typeface="Microsoft YaHei" panose="020B0503020204020204" pitchFamily="34" charset="-122"/>
+                <a:ea typeface="Microsoft YaHei" panose="020B0503020204020204" pitchFamily="34" charset="-122"/>
+              </a:rPr>
+              <a:t>https://public.tableau.com/views/DataTranslationCaseDashboard2/Dashboard2?:language=es-ES&amp;publish=yes&amp;:display_count=n&amp;:origin=viz_share_link</a:t>
+            </a:r>
+          </a:p>
+          <a:p>
+            <a:endParaRPr lang="es-MX" sz="2000" dirty="0">
+              <a:solidFill>
+                <a:schemeClr val="bg1"/>
+              </a:solidFill>
+              <a:latin typeface="Microsoft YaHei" panose="020B0503020204020204" pitchFamily="34" charset="-122"/>
+              <a:ea typeface="Microsoft YaHei" panose="020B0503020204020204" pitchFamily="34" charset="-122"/>
+            </a:endParaRPr>
+          </a:p>
+          <a:p>
+            <a:r>
+              <a:rPr lang="es-MX" sz="2800" b="1" dirty="0">
+                <a:solidFill>
+                  <a:schemeClr val="bg1"/>
+                </a:solidFill>
+                <a:latin typeface="Microsoft YaHei" panose="020B0503020204020204" pitchFamily="34" charset="-122"/>
+                <a:ea typeface="Microsoft YaHei" panose="020B0503020204020204" pitchFamily="34" charset="-122"/>
+              </a:rPr>
+              <a:t>Jupyter Notebook:</a:t>
+            </a:r>
+            <a:endParaRPr lang="es-MX" sz="2000" dirty="0">
+              <a:solidFill>
+                <a:schemeClr val="bg1"/>
+              </a:solidFill>
+              <a:latin typeface="Microsoft YaHei" panose="020B0503020204020204" pitchFamily="34" charset="-122"/>
+              <a:ea typeface="Microsoft YaHei" panose="020B0503020204020204" pitchFamily="34" charset="-122"/>
+            </a:endParaRPr>
+          </a:p>
+          <a:p>
+            <a:r>
+              <a:rPr lang="es-MX" sz="2000" dirty="0">
+                <a:solidFill>
+                  <a:schemeClr val="bg1"/>
+                </a:solidFill>
+                <a:latin typeface="Microsoft YaHei" panose="020B0503020204020204" pitchFamily="34" charset="-122"/>
+                <a:ea typeface="Microsoft YaHei" panose="020B0503020204020204" pitchFamily="34" charset="-122"/>
+              </a:rPr>
+              <a:t>https://github.com/fhg99/ArcaApplication/blob/master/analysis.ipynb</a:t>
+            </a:r>
+          </a:p>
+        </p:txBody>
+      </p:sp>
+      <p:sp>
+        <p:nvSpPr>
+          <p:cNvPr id="11" name="Título 1">
+            <a:extLst>
+              <a:ext uri="{FF2B5EF4-FFF2-40B4-BE49-F238E27FC236}">
+                <a16:creationId xmlns:a16="http://schemas.microsoft.com/office/drawing/2014/main" id="{033D2CF7-9001-10E8-2E2C-A4EABADDE5CC}"/>
+              </a:ext>
+            </a:extLst>
+          </p:cNvPr>
+          <p:cNvSpPr>
+            <a:spLocks noGrp="1"/>
+          </p:cNvSpPr>
+          <p:nvPr>
+            <p:ph type="title"/>
+          </p:nvPr>
+        </p:nvSpPr>
+        <p:spPr>
+          <a:xfrm>
+            <a:off x="538942" y="381935"/>
+            <a:ext cx="5082368" cy="1356924"/>
+          </a:xfrm>
+        </p:spPr>
+        <p:txBody>
+          <a:bodyPr anchor="ctr">
+            <a:normAutofit fontScale="90000"/>
+          </a:bodyPr>
+          <a:lstStyle/>
+          <a:p>
+            <a:r>
+              <a:rPr lang="es-MX" sz="8900" b="1" dirty="0">
+                <a:solidFill>
+                  <a:schemeClr val="bg1"/>
+                </a:solidFill>
+              </a:rPr>
+              <a:t>Appendix</a:t>
+            </a:r>
+            <a:endParaRPr lang="es-MX" sz="8000" b="1" dirty="0">
+              <a:solidFill>
+                <a:schemeClr val="bg1"/>
+              </a:solidFill>
+            </a:endParaRPr>
+          </a:p>
+        </p:txBody>
+      </p:sp>
+    </p:spTree>
+    <p:extLst>
+      <p:ext uri="{BB962C8B-B14F-4D97-AF65-F5344CB8AC3E}">
+        <p14:creationId xmlns:p14="http://schemas.microsoft.com/office/powerpoint/2010/main" val="1338049418"/>
+      </p:ext>
+    </p:extLst>
+  </p:cSld>
+  <p:clrMapOvr>
+    <a:masterClrMapping/>
+  </p:clrMapOvr>
+  <mc:AlternateContent xmlns:mc="http://schemas.openxmlformats.org/markup-compatibility/2006">
+    <mc:Choice xmlns:p14="http://schemas.microsoft.com/office/powerpoint/2010/main" Requires="p14">
+      <p:transition spd="slow" p14:dur="3400">
+        <p14:reveal/>
+      </p:transition>
+    </mc:Choice>
+    <mc:Fallback>
+      <p:transition spd="slow">
+        <p:fade/>
+      </p:transition>
+    </mc:Fallback>
+  </mc:AlternateContent>
+  <p:timing>
+    <p:tnLst>
+      <p:par>
+        <p:cTn id="1" dur="indefinite" restart="never" nodeType="tmRoot">
+          <p:childTnLst>
+            <p:seq concurrent="1" nextAc="seek">
+              <p:cTn id="2" dur="indefinite" nodeType="mainSeq">
+                <p:childTnLst>
+                  <p:par>
+                    <p:cTn id="3" fill="hold">
+                      <p:stCondLst>
+                        <p:cond delay="indefinite"/>
+                      </p:stCondLst>
+                      <p:childTnLst>
+                        <p:par>
+                          <p:cTn id="4" fill="hold">
+                            <p:stCondLst>
+                              <p:cond delay="0"/>
+                            </p:stCondLst>
+                            <p:childTnLst>
+                              <p:par>
+                                <p:cTn id="5" presetID="12" presetClass="entr" presetSubtype="4" fill="hold" grpId="0" nodeType="clickEffect">
+                                  <p:stCondLst>
+                                    <p:cond delay="0"/>
+                                  </p:stCondLst>
+                                  <p:childTnLst>
+                                    <p:set>
+                                      <p:cBhvr>
+                                        <p:cTn id="6" dur="1" fill="hold">
+                                          <p:stCondLst>
+                                            <p:cond delay="0"/>
+                                          </p:stCondLst>
+                                        </p:cTn>
+                                        <p:tgtEl>
+                                          <p:spTgt spid="7"/>
+                                        </p:tgtEl>
+                                        <p:attrNameLst>
+                                          <p:attrName>style.visibility</p:attrName>
+                                        </p:attrNameLst>
+                                      </p:cBhvr>
+                                      <p:to>
+                                        <p:strVal val="visible"/>
+                                      </p:to>
+                                    </p:set>
+                                    <p:anim calcmode="lin" valueType="num">
+                                      <p:cBhvr additive="base">
+                                        <p:cTn id="7" dur="500"/>
+                                        <p:tgtEl>
+                                          <p:spTgt spid="7"/>
+                                        </p:tgtEl>
+                                        <p:attrNameLst>
+                                          <p:attrName>ppt_y</p:attrName>
+                                        </p:attrNameLst>
+                                      </p:cBhvr>
+                                      <p:tavLst>
+                                        <p:tav tm="0">
+                                          <p:val>
+                                            <p:strVal val="#ppt_y+#ppt_h*1.125000"/>
+                                          </p:val>
+                                        </p:tav>
+                                        <p:tav tm="100000">
+                                          <p:val>
+                                            <p:strVal val="#ppt_y"/>
+                                          </p:val>
+                                        </p:tav>
+                                      </p:tavLst>
+                                    </p:anim>
+                                    <p:animEffect transition="in" filter="wipe(up)">
+                                      <p:cBhvr>
+                                        <p:cTn id="8" dur="500"/>
+                                        <p:tgtEl>
+                                          <p:spTgt spid="7"/>
+                                        </p:tgtEl>
+                                      </p:cBhvr>
+                                    </p:animEffect>
+                                  </p:childTnLst>
+                                </p:cTn>
+                              </p:par>
+                            </p:childTnLst>
+                          </p:cTn>
+                        </p:par>
+                      </p:childTnLst>
+                    </p:cTn>
+                  </p:par>
+                  <p:par>
+                    <p:cTn id="9" fill="hold">
+                      <p:stCondLst>
+                        <p:cond delay="indefinite"/>
+                      </p:stCondLst>
+                      <p:childTnLst>
+                        <p:par>
+                          <p:cTn id="10" fill="hold">
+                            <p:stCondLst>
+                              <p:cond delay="0"/>
+                            </p:stCondLst>
+                            <p:childTnLst>
+                              <p:par>
+                                <p:cTn id="11" presetID="3" presetClass="entr" presetSubtype="10" fill="hold" nodeType="clickEffect">
+                                  <p:stCondLst>
+                                    <p:cond delay="0"/>
+                                  </p:stCondLst>
+                                  <p:childTnLst>
+                                    <p:set>
+                                      <p:cBhvr>
+                                        <p:cTn id="12" dur="1" fill="hold">
+                                          <p:stCondLst>
+                                            <p:cond delay="0"/>
+                                          </p:stCondLst>
+                                        </p:cTn>
+                                        <p:tgtEl>
+                                          <p:spTgt spid="7">
+                                            <p:txEl>
+                                              <p:pRg st="0" end="0"/>
+                                            </p:txEl>
+                                          </p:spTgt>
+                                        </p:tgtEl>
+                                        <p:attrNameLst>
+                                          <p:attrName>style.visibility</p:attrName>
+                                        </p:attrNameLst>
+                                      </p:cBhvr>
+                                      <p:to>
+                                        <p:strVal val="visible"/>
+                                      </p:to>
+                                    </p:set>
+                                    <p:animEffect transition="in" filter="blinds(horizontal)">
+                                      <p:cBhvr>
+                                        <p:cTn id="13" dur="500"/>
+                                        <p:tgtEl>
+                                          <p:spTgt spid="7">
+                                            <p:txEl>
+                                              <p:pRg st="0" end="0"/>
+                                            </p:txEl>
+                                          </p:spTgt>
+                                        </p:tgtEl>
+                                      </p:cBhvr>
+                                    </p:animEffect>
+                                  </p:childTnLst>
+                                </p:cTn>
+                              </p:par>
+                              <p:par>
+                                <p:cTn id="14" presetID="3" presetClass="entr" presetSubtype="10" fill="hold" nodeType="withEffect">
+                                  <p:stCondLst>
+                                    <p:cond delay="0"/>
+                                  </p:stCondLst>
+                                  <p:childTnLst>
+                                    <p:set>
+                                      <p:cBhvr>
+                                        <p:cTn id="15" dur="1" fill="hold">
+                                          <p:stCondLst>
+                                            <p:cond delay="0"/>
+                                          </p:stCondLst>
+                                        </p:cTn>
+                                        <p:tgtEl>
+                                          <p:spTgt spid="7">
+                                            <p:txEl>
+                                              <p:pRg st="1" end="1"/>
+                                            </p:txEl>
+                                          </p:spTgt>
+                                        </p:tgtEl>
+                                        <p:attrNameLst>
+                                          <p:attrName>style.visibility</p:attrName>
+                                        </p:attrNameLst>
+                                      </p:cBhvr>
+                                      <p:to>
+                                        <p:strVal val="visible"/>
+                                      </p:to>
+                                    </p:set>
+                                    <p:animEffect transition="in" filter="blinds(horizontal)">
+                                      <p:cBhvr>
+                                        <p:cTn id="16" dur="500"/>
+                                        <p:tgtEl>
+                                          <p:spTgt spid="7">
+                                            <p:txEl>
+                                              <p:pRg st="1" end="1"/>
+                                            </p:txEl>
+                                          </p:spTgt>
+                                        </p:tgtEl>
+                                      </p:cBhvr>
+                                    </p:animEffect>
+                                  </p:childTnLst>
+                                </p:cTn>
+                              </p:par>
+                            </p:childTnLst>
+                          </p:cTn>
+                        </p:par>
+                      </p:childTnLst>
+                    </p:cTn>
+                  </p:par>
+                  <p:par>
+                    <p:cTn id="17" fill="hold">
+                      <p:stCondLst>
+                        <p:cond delay="indefinite"/>
+                      </p:stCondLst>
+                      <p:childTnLst>
+                        <p:par>
+                          <p:cTn id="18" fill="hold">
+                            <p:stCondLst>
+                              <p:cond delay="0"/>
+                            </p:stCondLst>
+                            <p:childTnLst>
+                              <p:par>
+                                <p:cTn id="19" presetID="3" presetClass="entr" presetSubtype="10" fill="hold" nodeType="clickEffect">
+                                  <p:stCondLst>
+                                    <p:cond delay="0"/>
+                                  </p:stCondLst>
+                                  <p:childTnLst>
+                                    <p:set>
+                                      <p:cBhvr>
+                                        <p:cTn id="20" dur="1" fill="hold">
+                                          <p:stCondLst>
+                                            <p:cond delay="0"/>
+                                          </p:stCondLst>
+                                        </p:cTn>
+                                        <p:tgtEl>
+                                          <p:spTgt spid="7">
+                                            <p:txEl>
+                                              <p:pRg st="3" end="3"/>
+                                            </p:txEl>
+                                          </p:spTgt>
+                                        </p:tgtEl>
+                                        <p:attrNameLst>
+                                          <p:attrName>style.visibility</p:attrName>
+                                        </p:attrNameLst>
+                                      </p:cBhvr>
+                                      <p:to>
+                                        <p:strVal val="visible"/>
+                                      </p:to>
+                                    </p:set>
+                                    <p:animEffect transition="in" filter="blinds(horizontal)">
+                                      <p:cBhvr>
+                                        <p:cTn id="21" dur="500"/>
+                                        <p:tgtEl>
+                                          <p:spTgt spid="7">
+                                            <p:txEl>
+                                              <p:pRg st="3" end="3"/>
+                                            </p:txEl>
+                                          </p:spTgt>
+                                        </p:tgtEl>
+                                      </p:cBhvr>
+                                    </p:animEffect>
+                                  </p:childTnLst>
+                                </p:cTn>
+                              </p:par>
+                              <p:par>
+                                <p:cTn id="22" presetID="3" presetClass="entr" presetSubtype="10" fill="hold" nodeType="withEffect">
+                                  <p:stCondLst>
+                                    <p:cond delay="0"/>
+                                  </p:stCondLst>
+                                  <p:childTnLst>
+                                    <p:set>
+                                      <p:cBhvr>
+                                        <p:cTn id="23" dur="1" fill="hold">
+                                          <p:stCondLst>
+                                            <p:cond delay="0"/>
+                                          </p:stCondLst>
+                                        </p:cTn>
+                                        <p:tgtEl>
+                                          <p:spTgt spid="7">
+                                            <p:txEl>
+                                              <p:charRg st="185" end="327"/>
+                                            </p:txEl>
+                                          </p:spTgt>
+                                        </p:tgtEl>
+                                        <p:attrNameLst>
+                                          <p:attrName>style.visibility</p:attrName>
+                                        </p:attrNameLst>
+                                      </p:cBhvr>
+                                      <p:to>
+                                        <p:strVal val="visible"/>
+                                      </p:to>
+                                    </p:set>
+                                    <p:animEffect transition="in" filter="blinds(horizontal)">
+                                      <p:cBhvr>
+                                        <p:cTn id="24" dur="500"/>
+                                        <p:tgtEl>
+                                          <p:spTgt spid="7">
+                                            <p:txEl>
+                                              <p:charRg st="185" end="327"/>
+                                            </p:txEl>
+                                          </p:spTgt>
+                                        </p:tgtEl>
+                                      </p:cBhvr>
+                                    </p:animEffect>
+                                  </p:childTnLst>
+                                </p:cTn>
+                              </p:par>
+                            </p:childTnLst>
+                          </p:cTn>
+                        </p:par>
+                      </p:childTnLst>
+                    </p:cTn>
+                  </p:par>
+                  <p:par>
+                    <p:cTn id="25" fill="hold">
+                      <p:stCondLst>
+                        <p:cond delay="indefinite"/>
+                      </p:stCondLst>
+                      <p:childTnLst>
+                        <p:par>
+                          <p:cTn id="26" fill="hold">
+                            <p:stCondLst>
+                              <p:cond delay="0"/>
+                            </p:stCondLst>
+                            <p:childTnLst>
+                              <p:par>
+                                <p:cTn id="27" presetID="3" presetClass="entr" presetSubtype="10" fill="hold" nodeType="clickEffect">
+                                  <p:stCondLst>
+                                    <p:cond delay="0"/>
+                                  </p:stCondLst>
+                                  <p:childTnLst>
+                                    <p:set>
+                                      <p:cBhvr>
+                                        <p:cTn id="28" dur="1" fill="hold">
+                                          <p:stCondLst>
+                                            <p:cond delay="0"/>
+                                          </p:stCondLst>
+                                        </p:cTn>
+                                        <p:tgtEl>
+                                          <p:spTgt spid="7">
+                                            <p:txEl>
+                                              <p:pRg st="6" end="6"/>
+                                            </p:txEl>
+                                          </p:spTgt>
+                                        </p:tgtEl>
+                                        <p:attrNameLst>
+                                          <p:attrName>style.visibility</p:attrName>
+                                        </p:attrNameLst>
+                                      </p:cBhvr>
+                                      <p:to>
+                                        <p:strVal val="visible"/>
+                                      </p:to>
+                                    </p:set>
+                                    <p:animEffect transition="in" filter="blinds(horizontal)">
+                                      <p:cBhvr>
+                                        <p:cTn id="29" dur="500"/>
+                                        <p:tgtEl>
+                                          <p:spTgt spid="7">
+                                            <p:txEl>
+                                              <p:pRg st="6" end="6"/>
+                                            </p:txEl>
+                                          </p:spTgt>
+                                        </p:tgtEl>
+                                      </p:cBhvr>
+                                    </p:animEffect>
+                                  </p:childTnLst>
+                                </p:cTn>
+                              </p:par>
+                              <p:par>
+                                <p:cTn id="30" presetID="3" presetClass="entr" presetSubtype="10" fill="hold" nodeType="withEffect">
+                                  <p:stCondLst>
+                                    <p:cond delay="0"/>
+                                  </p:stCondLst>
+                                  <p:childTnLst>
+                                    <p:set>
+                                      <p:cBhvr>
+                                        <p:cTn id="31" dur="1" fill="hold">
+                                          <p:stCondLst>
+                                            <p:cond delay="0"/>
+                                          </p:stCondLst>
+                                        </p:cTn>
+                                        <p:tgtEl>
+                                          <p:spTgt spid="7">
+                                            <p:txEl>
+                                              <p:charRg st="346" end="414"/>
+                                            </p:txEl>
+                                          </p:spTgt>
+                                        </p:tgtEl>
+                                        <p:attrNameLst>
+                                          <p:attrName>style.visibility</p:attrName>
+                                        </p:attrNameLst>
+                                      </p:cBhvr>
+                                      <p:to>
+                                        <p:strVal val="visible"/>
+                                      </p:to>
+                                    </p:set>
+                                    <p:animEffect transition="in" filter="blinds(horizontal)">
+                                      <p:cBhvr>
+                                        <p:cTn id="32" dur="500"/>
+                                        <p:tgtEl>
+                                          <p:spTgt spid="7">
+                                            <p:txEl>
+                                              <p:charRg st="346" end="414"/>
+                                            </p:txEl>
+                                          </p:spTgt>
+                                        </p:tgtEl>
+                                      </p:cBhvr>
+                                    </p:animEffect>
+                                  </p:childTnLst>
+                                </p:cTn>
+                              </p:par>
+                            </p:childTnLst>
+                          </p:cTn>
+                        </p:par>
+                      </p:childTnLst>
+                    </p:cTn>
+                  </p:par>
+                </p:childTnLst>
+              </p:cTn>
+              <p:prevCondLst>
+                <p:cond evt="onPrev" delay="0">
+                  <p:tgtEl>
+                    <p:sldTgt/>
+                  </p:tgtEl>
+                </p:cond>
+              </p:prevCondLst>
+              <p:nextCondLst>
+                <p:cond evt="onNext" delay="0">
+                  <p:tgtEl>
+                    <p:sldTgt/>
+                  </p:tgtEl>
+                </p:cond>
+              </p:nextCondLst>
+            </p:seq>
+          </p:childTnLst>
+        </p:cTn>
+      </p:par>
+    </p:tnLst>
+    <p:bldLst>
+      <p:bldP spid="7" grpId="0"/>
     </p:bldLst>
   </p:timing>
 </p:sld>

</xml_diff>